<commit_message>
update to pipeline and poster
</commit_message>
<xml_diff>
--- a/docs/qcert-poster.pptx
+++ b/docs/qcert-poster.pptx
@@ -243,7 +243,7 @@
           <a:p>
             <a:fld id="{6D4E502F-106A-5644-822E-51330CCC29FE}" type="datetimeFigureOut">
               <a:rPr lang="en-US" smtClean="0"/>
-              <a:t>4/12/17</a:t>
+              <a:t>4/14/17</a:t>
             </a:fld>
             <a:endParaRPr lang="en-US" dirty="0"/>
           </a:p>
@@ -413,7 +413,7 @@
           <a:p>
             <a:fld id="{6D4E502F-106A-5644-822E-51330CCC29FE}" type="datetimeFigureOut">
               <a:rPr lang="en-US" smtClean="0"/>
-              <a:t>4/12/17</a:t>
+              <a:t>4/14/17</a:t>
             </a:fld>
             <a:endParaRPr lang="en-US" dirty="0"/>
           </a:p>
@@ -593,7 +593,7 @@
           <a:p>
             <a:fld id="{6D4E502F-106A-5644-822E-51330CCC29FE}" type="datetimeFigureOut">
               <a:rPr lang="en-US" smtClean="0"/>
-              <a:t>4/12/17</a:t>
+              <a:t>4/14/17</a:t>
             </a:fld>
             <a:endParaRPr lang="en-US" dirty="0"/>
           </a:p>
@@ -699,7 +699,7 @@
           <a:p>
             <a:fld id="{6D4E502F-106A-5644-822E-51330CCC29FE}" type="datetimeFigureOut">
               <a:rPr lang="en-US" smtClean="0"/>
-              <a:t>4/12/17</a:t>
+              <a:t>4/14/17</a:t>
             </a:fld>
             <a:endParaRPr lang="en-US" dirty="0"/>
           </a:p>
@@ -943,7 +943,7 @@
           <a:p>
             <a:fld id="{6D4E502F-106A-5644-822E-51330CCC29FE}" type="datetimeFigureOut">
               <a:rPr lang="en-US" smtClean="0"/>
-              <a:t>4/12/17</a:t>
+              <a:t>4/14/17</a:t>
             </a:fld>
             <a:endParaRPr lang="en-US" dirty="0"/>
           </a:p>
@@ -1175,7 +1175,7 @@
           <a:p>
             <a:fld id="{6D4E502F-106A-5644-822E-51330CCC29FE}" type="datetimeFigureOut">
               <a:rPr lang="en-US" smtClean="0"/>
-              <a:t>4/12/17</a:t>
+              <a:t>4/14/17</a:t>
             </a:fld>
             <a:endParaRPr lang="en-US" dirty="0"/>
           </a:p>
@@ -1542,7 +1542,7 @@
           <a:p>
             <a:fld id="{6D4E502F-106A-5644-822E-51330CCC29FE}" type="datetimeFigureOut">
               <a:rPr lang="en-US" smtClean="0"/>
-              <a:t>4/12/17</a:t>
+              <a:t>4/14/17</a:t>
             </a:fld>
             <a:endParaRPr lang="en-US" dirty="0"/>
           </a:p>
@@ -1660,7 +1660,7 @@
           <a:p>
             <a:fld id="{6D4E502F-106A-5644-822E-51330CCC29FE}" type="datetimeFigureOut">
               <a:rPr lang="en-US" smtClean="0"/>
-              <a:t>4/12/17</a:t>
+              <a:t>4/14/17</a:t>
             </a:fld>
             <a:endParaRPr lang="en-US" dirty="0"/>
           </a:p>
@@ -1755,7 +1755,7 @@
           <a:p>
             <a:fld id="{6D4E502F-106A-5644-822E-51330CCC29FE}" type="datetimeFigureOut">
               <a:rPr lang="en-US" smtClean="0"/>
-              <a:t>4/12/17</a:t>
+              <a:t>4/14/17</a:t>
             </a:fld>
             <a:endParaRPr lang="en-US" dirty="0"/>
           </a:p>
@@ -2032,7 +2032,7 @@
           <a:p>
             <a:fld id="{6D4E502F-106A-5644-822E-51330CCC29FE}" type="datetimeFigureOut">
               <a:rPr lang="en-US" smtClean="0"/>
-              <a:t>4/12/17</a:t>
+              <a:t>4/14/17</a:t>
             </a:fld>
             <a:endParaRPr lang="en-US" dirty="0"/>
           </a:p>
@@ -2289,7 +2289,7 @@
           <a:p>
             <a:fld id="{6D4E502F-106A-5644-822E-51330CCC29FE}" type="datetimeFigureOut">
               <a:rPr lang="en-US" smtClean="0"/>
-              <a:t>4/12/17</a:t>
+              <a:t>4/14/17</a:t>
             </a:fld>
             <a:endParaRPr lang="en-US" dirty="0"/>
           </a:p>
@@ -2502,7 +2502,7 @@
           <a:p>
             <a:fld id="{6D4E502F-106A-5644-822E-51330CCC29FE}" type="datetimeFigureOut">
               <a:rPr lang="en-US" smtClean="0"/>
-              <a:t>4/12/17</a:t>
+              <a:t>4/14/17</a:t>
             </a:fld>
             <a:endParaRPr lang="en-US" dirty="0"/>
           </a:p>
@@ -2915,7 +2915,7 @@
         </p:nvGrpSpPr>
         <p:grpSpPr>
           <a:xfrm>
-            <a:off x="-151382" y="5876352"/>
+            <a:off x="-151382" y="5774752"/>
             <a:ext cx="22878345" cy="2847196"/>
             <a:chOff x="-1250366" y="8254483"/>
             <a:chExt cx="32410988" cy="3931921"/>
@@ -3624,42 +3624,171 @@
       </p:sp>
       <p:grpSp>
         <p:nvGrpSpPr>
-          <p:cNvPr id="45" name="Group 44"/>
+          <p:cNvPr id="4" name="Group 3"/>
           <p:cNvGrpSpPr/>
           <p:nvPr/>
         </p:nvGrpSpPr>
         <p:grpSpPr>
           <a:xfrm>
-            <a:off x="475589" y="8845047"/>
-            <a:ext cx="9959538" cy="4115969"/>
-            <a:chOff x="1905709" y="17464541"/>
-            <a:chExt cx="13819142" cy="5108837"/>
+            <a:off x="590252" y="17945709"/>
+            <a:ext cx="20765091" cy="8121515"/>
+            <a:chOff x="475589" y="8843965"/>
+            <a:chExt cx="20765091" cy="8121515"/>
           </a:xfrm>
         </p:grpSpPr>
         <p:grpSp>
           <p:nvGrpSpPr>
-            <p:cNvPr id="20" name="Group 19"/>
+            <p:cNvPr id="45" name="Group 44"/>
             <p:cNvGrpSpPr/>
             <p:nvPr/>
           </p:nvGrpSpPr>
           <p:grpSpPr>
             <a:xfrm>
-              <a:off x="1905709" y="17464541"/>
-              <a:ext cx="13819142" cy="5108837"/>
-              <a:chOff x="4283320" y="2423160"/>
-              <a:chExt cx="12179809" cy="4346673"/>
+              <a:off x="475589" y="8845046"/>
+              <a:ext cx="9534997" cy="3948894"/>
+              <a:chOff x="1905709" y="17464541"/>
+              <a:chExt cx="13230079" cy="4901460"/>
             </a:xfrm>
           </p:grpSpPr>
+          <p:grpSp>
+            <p:nvGrpSpPr>
+              <p:cNvPr id="20" name="Group 19"/>
+              <p:cNvGrpSpPr/>
+              <p:nvPr/>
+            </p:nvGrpSpPr>
+            <p:grpSpPr>
+              <a:xfrm>
+                <a:off x="1905709" y="17464541"/>
+                <a:ext cx="13230079" cy="4901460"/>
+                <a:chOff x="4283320" y="2423160"/>
+                <a:chExt cx="11660625" cy="4170234"/>
+              </a:xfrm>
+            </p:grpSpPr>
+            <p:sp>
+              <p:nvSpPr>
+                <p:cNvPr id="21" name="Rectangle 20"/>
+                <p:cNvSpPr/>
+                <p:nvPr/>
+              </p:nvSpPr>
+              <p:spPr>
+                <a:xfrm>
+                  <a:off x="4283320" y="2423160"/>
+                  <a:ext cx="11660625" cy="4170234"/>
+                </a:xfrm>
+                <a:prstGeom prst="rect">
+                  <a:avLst/>
+                </a:prstGeom>
+                <a:solidFill>
+                  <a:schemeClr val="bg1"/>
+                </a:solidFill>
+                <a:ln>
+                  <a:solidFill>
+                    <a:schemeClr val="bg1">
+                      <a:lumMod val="85000"/>
+                    </a:schemeClr>
+                  </a:solidFill>
+                </a:ln>
+              </p:spPr>
+              <p:style>
+                <a:lnRef idx="2">
+                  <a:schemeClr val="accent1">
+                    <a:shade val="50000"/>
+                  </a:schemeClr>
+                </a:lnRef>
+                <a:fillRef idx="1">
+                  <a:schemeClr val="accent1"/>
+                </a:fillRef>
+                <a:effectRef idx="0">
+                  <a:schemeClr val="accent1"/>
+                </a:effectRef>
+                <a:fontRef idx="minor">
+                  <a:schemeClr val="lt1"/>
+                </a:fontRef>
+              </p:style>
+              <p:txBody>
+                <a:bodyPr rtlCol="0" anchor="ctr"/>
+                <a:lstStyle/>
+                <a:p>
+                  <a:pPr algn="ctr"/>
+                  <a:r>
+                    <a:rPr lang="en-US" sz="3659" dirty="0" smtClean="0"/>
+                    <a:t>–</a:t>
+                  </a:r>
+                  <a:endParaRPr lang="en-US" sz="3659" dirty="0"/>
+                </a:p>
+              </p:txBody>
+            </p:sp>
+            <p:sp>
+              <p:nvSpPr>
+                <p:cNvPr id="24" name="Rectangle 23"/>
+                <p:cNvSpPr/>
+                <p:nvPr/>
+              </p:nvSpPr>
+              <p:spPr>
+                <a:xfrm>
+                  <a:off x="4283320" y="2424154"/>
+                  <a:ext cx="11660625" cy="648971"/>
+                </a:xfrm>
+                <a:prstGeom prst="rect">
+                  <a:avLst/>
+                </a:prstGeom>
+                <a:solidFill>
+                  <a:schemeClr val="accent5">
+                    <a:lumMod val="75000"/>
+                  </a:schemeClr>
+                </a:solidFill>
+                <a:ln>
+                  <a:noFill/>
+                </a:ln>
+              </p:spPr>
+              <p:style>
+                <a:lnRef idx="2">
+                  <a:schemeClr val="accent1">
+                    <a:shade val="50000"/>
+                  </a:schemeClr>
+                </a:lnRef>
+                <a:fillRef idx="1">
+                  <a:schemeClr val="accent1"/>
+                </a:fillRef>
+                <a:effectRef idx="0">
+                  <a:schemeClr val="accent1"/>
+                </a:effectRef>
+                <a:fontRef idx="minor">
+                  <a:schemeClr val="lt1"/>
+                </a:fontRef>
+              </p:style>
+              <p:txBody>
+                <a:bodyPr rtlCol="0" anchor="ctr"/>
+                <a:lstStyle/>
+                <a:p>
+                  <a:pPr algn="ctr"/>
+                  <a:r>
+                    <a:rPr lang="en-US" sz="3106" b="1" dirty="0" smtClean="0">
+                      <a:latin typeface="Courier" charset="0"/>
+                      <a:ea typeface="Courier" charset="0"/>
+                      <a:cs typeface="Courier" charset="0"/>
+                    </a:rPr>
+                    <a:t>Algebraic Equivalence</a:t>
+                  </a:r>
+                  <a:endParaRPr lang="en-US" sz="3106" b="1" dirty="0">
+                    <a:latin typeface="Courier" charset="0"/>
+                    <a:ea typeface="Courier" charset="0"/>
+                    <a:cs typeface="Courier" charset="0"/>
+                  </a:endParaRPr>
+                </a:p>
+              </p:txBody>
+            </p:sp>
+          </p:grpSp>
           <p:sp>
             <p:nvSpPr>
-              <p:cNvPr id="21" name="Rectangle 20"/>
-              <p:cNvSpPr/>
+              <p:cNvPr id="43" name="TextBox 42"/>
+              <p:cNvSpPr txBox="1"/>
               <p:nvPr/>
             </p:nvSpPr>
             <p:spPr>
               <a:xfrm>
-                <a:off x="4283320" y="2423160"/>
-                <a:ext cx="12179808" cy="4346673"/>
+                <a:off x="2164573" y="18430281"/>
+                <a:ext cx="12971215" cy="2788742"/>
               </a:xfrm>
               <a:prstGeom prst="rect">
                 <a:avLst/>
@@ -3667,182 +3796,447 @@
               <a:solidFill>
                 <a:schemeClr val="bg1"/>
               </a:solidFill>
-              <a:ln>
-                <a:solidFill>
-                  <a:schemeClr val="bg1">
-                    <a:lumMod val="85000"/>
-                  </a:schemeClr>
-                </a:solidFill>
-              </a:ln>
             </p:spPr>
-            <p:style>
-              <a:lnRef idx="2">
-                <a:schemeClr val="accent1">
-                  <a:shade val="50000"/>
-                </a:schemeClr>
-              </a:lnRef>
-              <a:fillRef idx="1">
-                <a:schemeClr val="accent1"/>
-              </a:fillRef>
-              <a:effectRef idx="0">
-                <a:schemeClr val="accent1"/>
-              </a:effectRef>
-              <a:fontRef idx="minor">
-                <a:schemeClr val="lt1"/>
-              </a:fontRef>
-            </p:style>
             <p:txBody>
-              <a:bodyPr rtlCol="0" anchor="ctr"/>
+              <a:bodyPr wrap="square" rtlCol="0">
+                <a:spAutoFit/>
+              </a:bodyPr>
               <a:lstStyle/>
               <a:p>
-                <a:pPr algn="ctr"/>
-                <a:r>
-                  <a:rPr lang="en-US" sz="3659" dirty="0" smtClean="0"/>
-                  <a:t>–</a:t>
-                </a:r>
-                <a:endParaRPr lang="en-US" sz="3659" dirty="0"/>
+                <a:r>
+                  <a:rPr lang="en-US" sz="2800" dirty="0" smtClean="0">
+                    <a:solidFill>
+                      <a:schemeClr val="accent5">
+                        <a:lumMod val="75000"/>
+                      </a:schemeClr>
+                    </a:solidFill>
+                    <a:latin typeface="Consolas" charset="0"/>
+                    <a:ea typeface="Consolas" charset="0"/>
+                    <a:cs typeface="Consolas" charset="0"/>
+                  </a:rPr>
+                  <a:t>Lemma</a:t>
+                </a:r>
+                <a:r>
+                  <a:rPr lang="en-US" sz="2800" dirty="0" smtClean="0">
+                    <a:latin typeface="Consolas" charset="0"/>
+                    <a:ea typeface="Consolas" charset="0"/>
+                    <a:cs typeface="Consolas" charset="0"/>
+                  </a:rPr>
+                  <a:t> </a:t>
+                </a:r>
+                <a:r>
+                  <a:rPr lang="en-US" sz="2800" dirty="0" err="1" smtClean="0">
+                    <a:latin typeface="Consolas" charset="0"/>
+                    <a:ea typeface="Consolas" charset="0"/>
+                    <a:cs typeface="Consolas" charset="0"/>
+                  </a:rPr>
+                  <a:t>select_union_distr</a:t>
+                </a:r>
+                <a:r>
+                  <a:rPr lang="en-US" sz="2800" dirty="0" smtClean="0">
+                    <a:latin typeface="Consolas" charset="0"/>
+                    <a:ea typeface="Consolas" charset="0"/>
+                    <a:cs typeface="Consolas" charset="0"/>
+                  </a:rPr>
+                  <a:t> q</a:t>
+                </a:r>
+                <a:r>
+                  <a:rPr lang="en-US" sz="2800" baseline="-25000" dirty="0" smtClean="0">
+                    <a:latin typeface="Consolas" charset="0"/>
+                    <a:ea typeface="Consolas" charset="0"/>
+                    <a:cs typeface="Consolas" charset="0"/>
+                  </a:rPr>
+                  <a:t>0</a:t>
+                </a:r>
+                <a:r>
+                  <a:rPr lang="en-US" sz="2800" dirty="0" smtClean="0">
+                    <a:latin typeface="Consolas" charset="0"/>
+                    <a:ea typeface="Consolas" charset="0"/>
+                    <a:cs typeface="Consolas" charset="0"/>
+                  </a:rPr>
+                  <a:t> q</a:t>
+                </a:r>
+                <a:r>
+                  <a:rPr lang="en-US" sz="2800" baseline="-25000" dirty="0" smtClean="0">
+                    <a:latin typeface="Consolas" charset="0"/>
+                    <a:ea typeface="Consolas" charset="0"/>
+                    <a:cs typeface="Consolas" charset="0"/>
+                  </a:rPr>
+                  <a:t>1</a:t>
+                </a:r>
+                <a:r>
+                  <a:rPr lang="en-US" sz="2800" dirty="0" smtClean="0">
+                    <a:latin typeface="Consolas" charset="0"/>
+                    <a:ea typeface="Consolas" charset="0"/>
+                    <a:cs typeface="Consolas" charset="0"/>
+                  </a:rPr>
+                  <a:t> q</a:t>
+                </a:r>
+                <a:r>
+                  <a:rPr lang="en-US" sz="2800" baseline="-25000" dirty="0" smtClean="0">
+                    <a:latin typeface="Consolas" charset="0"/>
+                    <a:ea typeface="Consolas" charset="0"/>
+                    <a:cs typeface="Consolas" charset="0"/>
+                  </a:rPr>
+                  <a:t>2</a:t>
+                </a:r>
+                <a:r>
+                  <a:rPr lang="en-US" sz="2800" dirty="0" smtClean="0">
+                    <a:latin typeface="Consolas" charset="0"/>
+                    <a:ea typeface="Consolas" charset="0"/>
+                    <a:cs typeface="Consolas" charset="0"/>
+                  </a:rPr>
+                  <a:t> :</a:t>
+                </a:r>
               </a:p>
-            </p:txBody>
-          </p:sp>
-          <p:cxnSp>
-            <p:nvCxnSpPr>
-              <p:cNvPr id="23" name="Straight Connector 22"/>
-              <p:cNvCxnSpPr/>
-              <p:nvPr/>
-            </p:nvCxnSpPr>
-            <p:spPr>
-              <a:xfrm>
-                <a:off x="4796812" y="3296455"/>
-                <a:ext cx="0" cy="2443760"/>
-              </a:xfrm>
-              <a:prstGeom prst="line">
-                <a:avLst/>
-              </a:prstGeom>
-              <a:ln w="152400">
-                <a:solidFill>
-                  <a:schemeClr val="bg2">
-                    <a:lumMod val="90000"/>
-                  </a:schemeClr>
-                </a:solidFill>
-              </a:ln>
-            </p:spPr>
-            <p:style>
-              <a:lnRef idx="1">
-                <a:schemeClr val="accent1"/>
-              </a:lnRef>
-              <a:fillRef idx="0">
-                <a:schemeClr val="accent1"/>
-              </a:fillRef>
-              <a:effectRef idx="0">
-                <a:schemeClr val="accent1"/>
-              </a:effectRef>
-              <a:fontRef idx="minor">
-                <a:schemeClr val="tx1"/>
-              </a:fontRef>
-            </p:style>
-          </p:cxnSp>
-          <p:sp>
-            <p:nvSpPr>
-              <p:cNvPr id="24" name="Rectangle 23"/>
-              <p:cNvSpPr/>
-              <p:nvPr/>
-            </p:nvSpPr>
-            <p:spPr>
-              <a:xfrm>
-                <a:off x="4283320" y="2424154"/>
-                <a:ext cx="12179809" cy="648971"/>
-              </a:xfrm>
-              <a:prstGeom prst="rect">
-                <a:avLst/>
-              </a:prstGeom>
-              <a:solidFill>
-                <a:schemeClr val="accent5">
-                  <a:lumMod val="75000"/>
-                </a:schemeClr>
-              </a:solidFill>
-              <a:ln>
-                <a:noFill/>
-              </a:ln>
-            </p:spPr>
-            <p:style>
-              <a:lnRef idx="2">
-                <a:schemeClr val="accent1">
-                  <a:shade val="50000"/>
-                </a:schemeClr>
-              </a:lnRef>
-              <a:fillRef idx="1">
-                <a:schemeClr val="accent1"/>
-              </a:fillRef>
-              <a:effectRef idx="0">
-                <a:schemeClr val="accent1"/>
-              </a:effectRef>
-              <a:fontRef idx="minor">
-                <a:schemeClr val="lt1"/>
-              </a:fontRef>
-            </p:style>
-            <p:txBody>
-              <a:bodyPr rtlCol="0" anchor="ctr"/>
-              <a:lstStyle/>
               <a:p>
-                <a:pPr algn="ctr"/>
-                <a:r>
-                  <a:rPr lang="en-US" sz="3106" b="1" dirty="0" smtClean="0">
-                    <a:latin typeface="Courier" charset="0"/>
-                    <a:ea typeface="Courier" charset="0"/>
-                    <a:cs typeface="Courier" charset="0"/>
-                  </a:rPr>
-                  <a:t>Algebraic Equivalence</a:t>
-                </a:r>
-                <a:endParaRPr lang="en-US" sz="3106" b="1" dirty="0">
-                  <a:latin typeface="Courier" charset="0"/>
-                  <a:ea typeface="Courier" charset="0"/>
-                  <a:cs typeface="Courier" charset="0"/>
-                </a:endParaRPr>
+                <a:r>
+                  <a:rPr lang="it-IT" sz="2800" dirty="0" smtClean="0">
+                    <a:latin typeface="Consolas" charset="0"/>
+                    <a:ea typeface="Consolas" charset="0"/>
+                    <a:cs typeface="Consolas" charset="0"/>
+                  </a:rPr>
+                  <a:t>    𝛔⟨ </a:t>
+                </a:r>
+                <a:r>
+                  <a:rPr lang="en-US" sz="2800" dirty="0" smtClean="0">
+                    <a:latin typeface="Consolas" charset="0"/>
+                    <a:ea typeface="Consolas" charset="0"/>
+                    <a:cs typeface="Consolas" charset="0"/>
+                  </a:rPr>
+                  <a:t>q</a:t>
+                </a:r>
+                <a:r>
+                  <a:rPr lang="en-US" sz="2800" baseline="-25000" dirty="0" smtClean="0">
+                    <a:latin typeface="Consolas" charset="0"/>
+                    <a:ea typeface="Consolas" charset="0"/>
+                    <a:cs typeface="Consolas" charset="0"/>
+                  </a:rPr>
+                  <a:t>0</a:t>
+                </a:r>
+                <a:r>
+                  <a:rPr lang="it-IT" sz="2800" dirty="0">
+                    <a:latin typeface="Consolas" charset="0"/>
+                    <a:ea typeface="Consolas" charset="0"/>
+                    <a:cs typeface="Consolas" charset="0"/>
+                  </a:rPr>
+                  <a:t> </a:t>
+                </a:r>
+                <a:r>
+                  <a:rPr lang="de-DE" sz="2800" dirty="0" smtClean="0">
+                    <a:latin typeface="Consolas" charset="0"/>
+                    <a:ea typeface="Consolas" charset="0"/>
+                    <a:cs typeface="Consolas" charset="0"/>
+                  </a:rPr>
+                  <a:t>⟩(</a:t>
+                </a:r>
+                <a:r>
+                  <a:rPr lang="en-US" sz="2800" dirty="0">
+                    <a:latin typeface="Consolas" charset="0"/>
+                    <a:ea typeface="Consolas" charset="0"/>
+                    <a:cs typeface="Consolas" charset="0"/>
+                  </a:rPr>
+                  <a:t>q</a:t>
+                </a:r>
+                <a:r>
+                  <a:rPr lang="en-US" sz="2800" baseline="-25000" dirty="0">
+                    <a:latin typeface="Consolas" charset="0"/>
+                    <a:ea typeface="Consolas" charset="0"/>
+                    <a:cs typeface="Consolas" charset="0"/>
+                  </a:rPr>
+                  <a:t>1</a:t>
+                </a:r>
+                <a:r>
+                  <a:rPr lang="en-US" sz="2800" dirty="0">
+                    <a:latin typeface="Consolas" charset="0"/>
+                    <a:ea typeface="Consolas" charset="0"/>
+                    <a:cs typeface="Consolas" charset="0"/>
+                  </a:rPr>
+                  <a:t> </a:t>
+                </a:r>
+                <a:r>
+                  <a:rPr lang="en-US" sz="2800" dirty="0" smtClean="0">
+                    <a:latin typeface="Consolas" charset="0"/>
+                    <a:ea typeface="Consolas" charset="0"/>
+                    <a:cs typeface="Consolas" charset="0"/>
+                  </a:rPr>
+                  <a:t>∪ q</a:t>
+                </a:r>
+                <a:r>
+                  <a:rPr lang="en-US" sz="2800" baseline="-25000" dirty="0" smtClean="0">
+                    <a:latin typeface="Consolas" charset="0"/>
+                    <a:ea typeface="Consolas" charset="0"/>
+                    <a:cs typeface="Consolas" charset="0"/>
+                  </a:rPr>
+                  <a:t>2</a:t>
+                </a:r>
+                <a:r>
+                  <a:rPr lang="de-DE" sz="2800" dirty="0">
+                    <a:latin typeface="Consolas" charset="0"/>
+                    <a:ea typeface="Consolas" charset="0"/>
+                    <a:cs typeface="Consolas" charset="0"/>
+                  </a:rPr>
+                  <a:t>) </a:t>
+                </a:r>
+                <a:r>
+                  <a:rPr lang="de-DE" sz="2800" dirty="0" smtClean="0">
+                    <a:latin typeface="Consolas" charset="0"/>
+                    <a:ea typeface="Consolas" charset="0"/>
+                    <a:cs typeface="Consolas" charset="0"/>
+                  </a:rPr>
+                  <a:t>≡ </a:t>
+                </a:r>
+                <a:r>
+                  <a:rPr lang="it-IT" sz="2800" dirty="0">
+                    <a:latin typeface="Consolas" charset="0"/>
+                    <a:ea typeface="Consolas" charset="0"/>
+                    <a:cs typeface="Consolas" charset="0"/>
+                  </a:rPr>
+                  <a:t>𝛔</a:t>
+                </a:r>
+                <a:r>
+                  <a:rPr lang="it-IT" sz="2800" dirty="0" smtClean="0">
+                    <a:latin typeface="Consolas" charset="0"/>
+                    <a:ea typeface="Consolas" charset="0"/>
+                    <a:cs typeface="Consolas" charset="0"/>
+                  </a:rPr>
+                  <a:t>⟨</a:t>
+                </a:r>
+                <a:r>
+                  <a:rPr lang="it-IT" sz="2800" dirty="0">
+                    <a:latin typeface="Consolas" charset="0"/>
+                    <a:ea typeface="Consolas" charset="0"/>
+                    <a:cs typeface="Consolas" charset="0"/>
+                  </a:rPr>
+                  <a:t> </a:t>
+                </a:r>
+                <a:r>
+                  <a:rPr lang="en-US" sz="2800" dirty="0" smtClean="0">
+                    <a:latin typeface="Consolas" charset="0"/>
+                    <a:ea typeface="Consolas" charset="0"/>
+                    <a:cs typeface="Consolas" charset="0"/>
+                  </a:rPr>
+                  <a:t>q</a:t>
+                </a:r>
+                <a:r>
+                  <a:rPr lang="en-US" sz="2800" baseline="-25000" dirty="0" smtClean="0">
+                    <a:latin typeface="Consolas" charset="0"/>
+                    <a:ea typeface="Consolas" charset="0"/>
+                    <a:cs typeface="Consolas" charset="0"/>
+                  </a:rPr>
+                  <a:t>0</a:t>
+                </a:r>
+                <a:r>
+                  <a:rPr lang="it-IT" sz="2800" dirty="0">
+                    <a:latin typeface="Consolas" charset="0"/>
+                    <a:ea typeface="Consolas" charset="0"/>
+                    <a:cs typeface="Consolas" charset="0"/>
+                  </a:rPr>
+                  <a:t> </a:t>
+                </a:r>
+                <a:r>
+                  <a:rPr lang="de-DE" sz="2800" dirty="0" smtClean="0">
+                    <a:latin typeface="Consolas" charset="0"/>
+                    <a:ea typeface="Consolas" charset="0"/>
+                    <a:cs typeface="Consolas" charset="0"/>
+                  </a:rPr>
+                  <a:t>⟩</a:t>
+                </a:r>
+                <a:r>
+                  <a:rPr lang="de-DE" sz="2800" dirty="0">
+                    <a:latin typeface="Consolas" charset="0"/>
+                    <a:ea typeface="Consolas" charset="0"/>
+                    <a:cs typeface="Consolas" charset="0"/>
+                  </a:rPr>
+                  <a:t>(</a:t>
+                </a:r>
+                <a:r>
+                  <a:rPr lang="en-US" sz="2800" dirty="0" smtClean="0">
+                    <a:latin typeface="Consolas" charset="0"/>
+                    <a:ea typeface="Consolas" charset="0"/>
+                    <a:cs typeface="Consolas" charset="0"/>
+                  </a:rPr>
+                  <a:t>q</a:t>
+                </a:r>
+                <a:r>
+                  <a:rPr lang="en-US" sz="2800" baseline="-25000" dirty="0" smtClean="0">
+                    <a:latin typeface="Consolas" charset="0"/>
+                    <a:ea typeface="Consolas" charset="0"/>
+                    <a:cs typeface="Consolas" charset="0"/>
+                  </a:rPr>
+                  <a:t>1</a:t>
+                </a:r>
+                <a:r>
+                  <a:rPr lang="en-US" sz="2800" dirty="0" smtClean="0">
+                    <a:latin typeface="Consolas" charset="0"/>
+                    <a:ea typeface="Consolas" charset="0"/>
+                    <a:cs typeface="Consolas" charset="0"/>
+                  </a:rPr>
+                  <a:t>) ∪ </a:t>
+                </a:r>
+                <a:r>
+                  <a:rPr lang="it-IT" sz="2800" dirty="0">
+                    <a:latin typeface="Consolas" charset="0"/>
+                    <a:ea typeface="Consolas" charset="0"/>
+                    <a:cs typeface="Consolas" charset="0"/>
+                  </a:rPr>
+                  <a:t>𝛔</a:t>
+                </a:r>
+                <a:r>
+                  <a:rPr lang="it-IT" sz="2800" dirty="0" smtClean="0">
+                    <a:latin typeface="Consolas" charset="0"/>
+                    <a:ea typeface="Consolas" charset="0"/>
+                    <a:cs typeface="Consolas" charset="0"/>
+                  </a:rPr>
+                  <a:t>⟨</a:t>
+                </a:r>
+                <a:r>
+                  <a:rPr lang="it-IT" sz="2800" dirty="0">
+                    <a:latin typeface="Consolas" charset="0"/>
+                    <a:ea typeface="Consolas" charset="0"/>
+                    <a:cs typeface="Consolas" charset="0"/>
+                  </a:rPr>
+                  <a:t> </a:t>
+                </a:r>
+                <a:r>
+                  <a:rPr lang="en-US" sz="2800" dirty="0" smtClean="0">
+                    <a:latin typeface="Consolas" charset="0"/>
+                    <a:ea typeface="Consolas" charset="0"/>
+                    <a:cs typeface="Consolas" charset="0"/>
+                  </a:rPr>
+                  <a:t>q</a:t>
+                </a:r>
+                <a:r>
+                  <a:rPr lang="en-US" sz="2800" baseline="-25000" dirty="0" smtClean="0">
+                    <a:latin typeface="Consolas" charset="0"/>
+                    <a:ea typeface="Consolas" charset="0"/>
+                    <a:cs typeface="Consolas" charset="0"/>
+                  </a:rPr>
+                  <a:t>0</a:t>
+                </a:r>
+                <a:r>
+                  <a:rPr lang="it-IT" sz="2800" dirty="0">
+                    <a:latin typeface="Consolas" charset="0"/>
+                    <a:ea typeface="Consolas" charset="0"/>
+                    <a:cs typeface="Consolas" charset="0"/>
+                  </a:rPr>
+                  <a:t> </a:t>
+                </a:r>
+                <a:r>
+                  <a:rPr lang="de-DE" sz="2800" dirty="0" smtClean="0">
+                    <a:latin typeface="Consolas" charset="0"/>
+                    <a:ea typeface="Consolas" charset="0"/>
+                    <a:cs typeface="Consolas" charset="0"/>
+                  </a:rPr>
+                  <a:t>⟩(</a:t>
+                </a:r>
+                <a:r>
+                  <a:rPr lang="en-US" sz="2800" dirty="0" smtClean="0">
+                    <a:latin typeface="Consolas" charset="0"/>
+                    <a:ea typeface="Consolas" charset="0"/>
+                    <a:cs typeface="Consolas" charset="0"/>
+                  </a:rPr>
+                  <a:t>q</a:t>
+                </a:r>
+                <a:r>
+                  <a:rPr lang="en-US" sz="2800" baseline="-25000" dirty="0" smtClean="0">
+                    <a:latin typeface="Consolas" charset="0"/>
+                    <a:ea typeface="Consolas" charset="0"/>
+                    <a:cs typeface="Consolas" charset="0"/>
+                  </a:rPr>
+                  <a:t>2</a:t>
+                </a:r>
+                <a:r>
+                  <a:rPr lang="de-DE" sz="2800" dirty="0" smtClean="0">
+                    <a:latin typeface="Consolas" charset="0"/>
+                    <a:ea typeface="Consolas" charset="0"/>
+                    <a:cs typeface="Consolas" charset="0"/>
+                  </a:rPr>
+                  <a:t>).</a:t>
+                </a:r>
               </a:p>
-            </p:txBody>
-          </p:sp>
-        </p:grpSp>
-        <p:sp>
-          <p:nvSpPr>
-            <p:cNvPr id="43" name="TextBox 42"/>
-            <p:cNvSpPr txBox="1"/>
-            <p:nvPr/>
-          </p:nvSpPr>
-          <p:spPr>
-            <a:xfrm>
-              <a:off x="2753636" y="18430281"/>
-              <a:ext cx="12150548" cy="3026549"/>
-            </a:xfrm>
-            <a:prstGeom prst="rect">
-              <a:avLst/>
-            </a:prstGeom>
-            <a:solidFill>
-              <a:schemeClr val="bg1"/>
-            </a:solidFill>
-          </p:spPr>
-          <p:txBody>
-            <a:bodyPr wrap="square" rtlCol="0">
-              <a:spAutoFit/>
-            </a:bodyPr>
-            <a:lstStyle/>
-            <a:p>
-              <a:r>
-                <a:rPr lang="en-US" sz="2541" dirty="0" smtClean="0">
-                  <a:solidFill>
-                    <a:schemeClr val="accent6">
-                      <a:lumMod val="75000"/>
-                    </a:schemeClr>
-                  </a:solidFill>
-                  <a:latin typeface="Consolas" charset="0"/>
-                  <a:ea typeface="Consolas" charset="0"/>
-                  <a:cs typeface="Consolas" charset="0"/>
-                </a:rPr>
-                <a:t>(* Selection distributes over union *)</a:t>
-              </a:r>
-            </a:p>
-            <a:p>
-              <a:r>
-                <a:rPr lang="en-US" sz="2541" dirty="0" smtClean="0">
+              <a:p>
+                <a:r>
+                  <a:rPr lang="en-US" sz="2800" dirty="0" smtClean="0">
+                    <a:solidFill>
+                      <a:schemeClr val="accent5">
+                        <a:lumMod val="75000"/>
+                      </a:schemeClr>
+                    </a:solidFill>
+                    <a:latin typeface="Consolas" charset="0"/>
+                    <a:ea typeface="Consolas" charset="0"/>
+                    <a:cs typeface="Consolas" charset="0"/>
+                  </a:rPr>
+                  <a:t>Proof.</a:t>
+                </a:r>
+              </a:p>
+              <a:p>
+                <a:r>
+                  <a:rPr lang="en-US" sz="2800" dirty="0" smtClean="0">
+                    <a:solidFill>
+                      <a:schemeClr val="accent5">
+                        <a:lumMod val="75000"/>
+                      </a:schemeClr>
+                    </a:solidFill>
+                    <a:latin typeface="Consolas" charset="0"/>
+                    <a:ea typeface="Consolas" charset="0"/>
+                    <a:cs typeface="Consolas" charset="0"/>
+                  </a:rPr>
+                  <a:t>  </a:t>
+                </a:r>
+                <a:r>
+                  <a:rPr lang="mr-IN" sz="2800" dirty="0" smtClean="0">
+                    <a:solidFill>
+                      <a:schemeClr val="accent5">
+                        <a:lumMod val="75000"/>
+                      </a:schemeClr>
+                    </a:solidFill>
+                    <a:latin typeface="Consolas" charset="0"/>
+                    <a:ea typeface="Consolas" charset="0"/>
+                    <a:cs typeface="Consolas" charset="0"/>
+                  </a:rPr>
+                  <a:t>…</a:t>
+                </a:r>
+                <a:r>
+                  <a:rPr lang="en-US" sz="2800" dirty="0" smtClean="0">
+                    <a:solidFill>
+                      <a:schemeClr val="accent5">
+                        <a:lumMod val="75000"/>
+                      </a:schemeClr>
+                    </a:solidFill>
+                    <a:latin typeface="Consolas" charset="0"/>
+                    <a:ea typeface="Consolas" charset="0"/>
+                    <a:cs typeface="Consolas" charset="0"/>
+                  </a:rPr>
+                  <a:t> </a:t>
+                </a:r>
+                <a:r>
+                  <a:rPr lang="en-US" sz="2800" dirty="0">
+                    <a:solidFill>
+                      <a:schemeClr val="accent6">
+                        <a:lumMod val="75000"/>
+                      </a:schemeClr>
+                    </a:solidFill>
+                    <a:latin typeface="Consolas" charset="0"/>
+                    <a:ea typeface="Consolas" charset="0"/>
+                    <a:cs typeface="Consolas" charset="0"/>
+                  </a:rPr>
+                  <a:t>(* </a:t>
+                </a:r>
+                <a:r>
+                  <a:rPr lang="en-US" sz="2800" dirty="0" smtClean="0">
+                    <a:solidFill>
+                      <a:schemeClr val="accent6">
+                        <a:lumMod val="75000"/>
+                      </a:schemeClr>
+                    </a:solidFill>
+                    <a:latin typeface="Consolas" charset="0"/>
+                    <a:ea typeface="Consolas" charset="0"/>
+                    <a:cs typeface="Consolas" charset="0"/>
+                  </a:rPr>
+                  <a:t>proof omitted *)</a:t>
+                </a:r>
+                <a:endParaRPr lang="en-US" sz="2800" dirty="0" smtClean="0">
                   <a:solidFill>
                     <a:schemeClr val="accent5">
                       <a:lumMod val="75000"/>
@@ -3851,351 +4245,36 @@
                   <a:latin typeface="Consolas" charset="0"/>
                   <a:ea typeface="Consolas" charset="0"/>
                   <a:cs typeface="Consolas" charset="0"/>
-                </a:rPr>
-                <a:t>Lemma</a:t>
-              </a:r>
-              <a:r>
-                <a:rPr lang="en-US" sz="2541" dirty="0" smtClean="0">
-                  <a:latin typeface="Consolas" charset="0"/>
-                  <a:ea typeface="Consolas" charset="0"/>
-                  <a:cs typeface="Consolas" charset="0"/>
-                </a:rPr>
-                <a:t> </a:t>
-              </a:r>
-              <a:r>
-                <a:rPr lang="en-US" sz="2541" dirty="0" err="1" smtClean="0">
-                  <a:latin typeface="Consolas" charset="0"/>
-                  <a:ea typeface="Consolas" charset="0"/>
-                  <a:cs typeface="Consolas" charset="0"/>
-                </a:rPr>
-                <a:t>select_union_distr</a:t>
-              </a:r>
-              <a:r>
-                <a:rPr lang="en-US" sz="2541" dirty="0" smtClean="0">
-                  <a:latin typeface="Consolas" charset="0"/>
-                  <a:ea typeface="Consolas" charset="0"/>
-                  <a:cs typeface="Consolas" charset="0"/>
-                </a:rPr>
-                <a:t> q</a:t>
-              </a:r>
-              <a:r>
-                <a:rPr lang="en-US" sz="2541" baseline="-25000" dirty="0" smtClean="0">
-                  <a:latin typeface="Consolas" charset="0"/>
-                  <a:ea typeface="Consolas" charset="0"/>
-                  <a:cs typeface="Consolas" charset="0"/>
-                </a:rPr>
-                <a:t>0</a:t>
-              </a:r>
-              <a:r>
-                <a:rPr lang="en-US" sz="2541" dirty="0" smtClean="0">
-                  <a:latin typeface="Consolas" charset="0"/>
-                  <a:ea typeface="Consolas" charset="0"/>
-                  <a:cs typeface="Consolas" charset="0"/>
-                </a:rPr>
-                <a:t> q</a:t>
-              </a:r>
-              <a:r>
-                <a:rPr lang="en-US" sz="2541" baseline="-25000" dirty="0" smtClean="0">
-                  <a:latin typeface="Consolas" charset="0"/>
-                  <a:ea typeface="Consolas" charset="0"/>
-                  <a:cs typeface="Consolas" charset="0"/>
-                </a:rPr>
-                <a:t>1</a:t>
-              </a:r>
-              <a:r>
-                <a:rPr lang="en-US" sz="2541" dirty="0" smtClean="0">
-                  <a:latin typeface="Consolas" charset="0"/>
-                  <a:ea typeface="Consolas" charset="0"/>
-                  <a:cs typeface="Consolas" charset="0"/>
-                </a:rPr>
-                <a:t> q</a:t>
-              </a:r>
-              <a:r>
-                <a:rPr lang="en-US" sz="2541" baseline="-25000" dirty="0" smtClean="0">
-                  <a:latin typeface="Consolas" charset="0"/>
-                  <a:ea typeface="Consolas" charset="0"/>
-                  <a:cs typeface="Consolas" charset="0"/>
-                </a:rPr>
-                <a:t>2</a:t>
-              </a:r>
-              <a:r>
-                <a:rPr lang="en-US" sz="2541" dirty="0" smtClean="0">
-                  <a:latin typeface="Consolas" charset="0"/>
-                  <a:ea typeface="Consolas" charset="0"/>
-                  <a:cs typeface="Consolas" charset="0"/>
-                </a:rPr>
-                <a:t> :</a:t>
-              </a:r>
-            </a:p>
-            <a:p>
-              <a:r>
-                <a:rPr lang="it-IT" sz="2541" dirty="0" smtClean="0">
-                  <a:latin typeface="Consolas" charset="0"/>
-                  <a:ea typeface="Consolas" charset="0"/>
-                  <a:cs typeface="Consolas" charset="0"/>
-                </a:rPr>
-                <a:t>    𝛔⟨ </a:t>
-              </a:r>
-              <a:r>
-                <a:rPr lang="en-US" sz="2541" dirty="0" smtClean="0">
-                  <a:latin typeface="Consolas" charset="0"/>
-                  <a:ea typeface="Consolas" charset="0"/>
-                  <a:cs typeface="Consolas" charset="0"/>
-                </a:rPr>
-                <a:t>q</a:t>
-              </a:r>
-              <a:r>
-                <a:rPr lang="en-US" sz="2541" baseline="-25000" dirty="0" smtClean="0">
-                  <a:latin typeface="Consolas" charset="0"/>
-                  <a:ea typeface="Consolas" charset="0"/>
-                  <a:cs typeface="Consolas" charset="0"/>
-                </a:rPr>
-                <a:t>0</a:t>
-              </a:r>
-              <a:r>
-                <a:rPr lang="it-IT" sz="2541" dirty="0">
-                  <a:latin typeface="Consolas" charset="0"/>
-                  <a:ea typeface="Consolas" charset="0"/>
-                  <a:cs typeface="Consolas" charset="0"/>
-                </a:rPr>
-                <a:t> </a:t>
-              </a:r>
-              <a:r>
-                <a:rPr lang="de-DE" sz="2541" dirty="0" smtClean="0">
-                  <a:latin typeface="Consolas" charset="0"/>
-                  <a:ea typeface="Consolas" charset="0"/>
-                  <a:cs typeface="Consolas" charset="0"/>
-                </a:rPr>
-                <a:t>⟩(</a:t>
-              </a:r>
-              <a:r>
-                <a:rPr lang="en-US" sz="2541" dirty="0">
-                  <a:latin typeface="Consolas" charset="0"/>
-                  <a:ea typeface="Consolas" charset="0"/>
-                  <a:cs typeface="Consolas" charset="0"/>
-                </a:rPr>
-                <a:t>q</a:t>
-              </a:r>
-              <a:r>
-                <a:rPr lang="en-US" sz="2541" baseline="-25000" dirty="0">
-                  <a:latin typeface="Consolas" charset="0"/>
-                  <a:ea typeface="Consolas" charset="0"/>
-                  <a:cs typeface="Consolas" charset="0"/>
-                </a:rPr>
-                <a:t>1</a:t>
-              </a:r>
-              <a:r>
-                <a:rPr lang="en-US" sz="2541" dirty="0">
-                  <a:latin typeface="Consolas" charset="0"/>
-                  <a:ea typeface="Consolas" charset="0"/>
-                  <a:cs typeface="Consolas" charset="0"/>
-                </a:rPr>
-                <a:t> </a:t>
-              </a:r>
-              <a:r>
-                <a:rPr lang="en-US" sz="2541" dirty="0" smtClean="0">
-                  <a:latin typeface="Consolas" charset="0"/>
-                  <a:ea typeface="Consolas" charset="0"/>
-                  <a:cs typeface="Consolas" charset="0"/>
-                </a:rPr>
-                <a:t>∪ q</a:t>
-              </a:r>
-              <a:r>
-                <a:rPr lang="en-US" sz="2541" baseline="-25000" dirty="0" smtClean="0">
-                  <a:latin typeface="Consolas" charset="0"/>
-                  <a:ea typeface="Consolas" charset="0"/>
-                  <a:cs typeface="Consolas" charset="0"/>
-                </a:rPr>
-                <a:t>2</a:t>
-              </a:r>
-              <a:r>
-                <a:rPr lang="de-DE" sz="2541" dirty="0">
-                  <a:latin typeface="Consolas" charset="0"/>
-                  <a:ea typeface="Consolas" charset="0"/>
-                  <a:cs typeface="Consolas" charset="0"/>
-                </a:rPr>
-                <a:t>) </a:t>
-              </a:r>
-              <a:r>
-                <a:rPr lang="de-DE" sz="2541" dirty="0" smtClean="0">
-                  <a:latin typeface="Consolas" charset="0"/>
-                  <a:ea typeface="Consolas" charset="0"/>
-                  <a:cs typeface="Consolas" charset="0"/>
-                </a:rPr>
-                <a:t>≡ </a:t>
-              </a:r>
-              <a:r>
-                <a:rPr lang="it-IT" sz="2541" dirty="0">
-                  <a:latin typeface="Consolas" charset="0"/>
-                  <a:ea typeface="Consolas" charset="0"/>
-                  <a:cs typeface="Consolas" charset="0"/>
-                </a:rPr>
-                <a:t>𝛔</a:t>
-              </a:r>
-              <a:r>
-                <a:rPr lang="it-IT" sz="2541" dirty="0" smtClean="0">
-                  <a:latin typeface="Consolas" charset="0"/>
-                  <a:ea typeface="Consolas" charset="0"/>
-                  <a:cs typeface="Consolas" charset="0"/>
-                </a:rPr>
-                <a:t>⟨</a:t>
-              </a:r>
-              <a:r>
-                <a:rPr lang="it-IT" sz="2541" dirty="0">
-                  <a:latin typeface="Consolas" charset="0"/>
-                  <a:ea typeface="Consolas" charset="0"/>
-                  <a:cs typeface="Consolas" charset="0"/>
-                </a:rPr>
-                <a:t> </a:t>
-              </a:r>
-              <a:r>
-                <a:rPr lang="en-US" sz="2541" dirty="0" smtClean="0">
-                  <a:latin typeface="Consolas" charset="0"/>
-                  <a:ea typeface="Consolas" charset="0"/>
-                  <a:cs typeface="Consolas" charset="0"/>
-                </a:rPr>
-                <a:t>q</a:t>
-              </a:r>
-              <a:r>
-                <a:rPr lang="en-US" sz="2541" baseline="-25000" dirty="0" smtClean="0">
-                  <a:latin typeface="Consolas" charset="0"/>
-                  <a:ea typeface="Consolas" charset="0"/>
-                  <a:cs typeface="Consolas" charset="0"/>
-                </a:rPr>
-                <a:t>0</a:t>
-              </a:r>
-              <a:r>
-                <a:rPr lang="it-IT" sz="2541" dirty="0">
-                  <a:latin typeface="Consolas" charset="0"/>
-                  <a:ea typeface="Consolas" charset="0"/>
-                  <a:cs typeface="Consolas" charset="0"/>
-                </a:rPr>
-                <a:t> </a:t>
-              </a:r>
-              <a:r>
-                <a:rPr lang="de-DE" sz="2541" dirty="0" smtClean="0">
-                  <a:latin typeface="Consolas" charset="0"/>
-                  <a:ea typeface="Consolas" charset="0"/>
-                  <a:cs typeface="Consolas" charset="0"/>
-                </a:rPr>
-                <a:t>⟩</a:t>
-              </a:r>
-              <a:r>
-                <a:rPr lang="de-DE" sz="2541" dirty="0">
-                  <a:latin typeface="Consolas" charset="0"/>
-                  <a:ea typeface="Consolas" charset="0"/>
-                  <a:cs typeface="Consolas" charset="0"/>
-                </a:rPr>
-                <a:t>(</a:t>
-              </a:r>
-              <a:r>
-                <a:rPr lang="en-US" sz="2541" dirty="0" smtClean="0">
-                  <a:latin typeface="Consolas" charset="0"/>
-                  <a:ea typeface="Consolas" charset="0"/>
-                  <a:cs typeface="Consolas" charset="0"/>
-                </a:rPr>
-                <a:t>q</a:t>
-              </a:r>
-              <a:r>
-                <a:rPr lang="en-US" sz="2541" baseline="-25000" dirty="0" smtClean="0">
-                  <a:latin typeface="Consolas" charset="0"/>
-                  <a:ea typeface="Consolas" charset="0"/>
-                  <a:cs typeface="Consolas" charset="0"/>
-                </a:rPr>
-                <a:t>1</a:t>
-              </a:r>
-              <a:r>
-                <a:rPr lang="en-US" sz="2541" dirty="0" smtClean="0">
-                  <a:latin typeface="Consolas" charset="0"/>
-                  <a:ea typeface="Consolas" charset="0"/>
-                  <a:cs typeface="Consolas" charset="0"/>
-                </a:rPr>
-                <a:t>) ∪ </a:t>
-              </a:r>
-              <a:r>
-                <a:rPr lang="it-IT" sz="2541" dirty="0">
-                  <a:latin typeface="Consolas" charset="0"/>
-                  <a:ea typeface="Consolas" charset="0"/>
-                  <a:cs typeface="Consolas" charset="0"/>
-                </a:rPr>
-                <a:t>𝛔</a:t>
-              </a:r>
-              <a:r>
-                <a:rPr lang="it-IT" sz="2541" dirty="0" smtClean="0">
-                  <a:latin typeface="Consolas" charset="0"/>
-                  <a:ea typeface="Consolas" charset="0"/>
-                  <a:cs typeface="Consolas" charset="0"/>
-                </a:rPr>
-                <a:t>⟨</a:t>
-              </a:r>
-              <a:r>
-                <a:rPr lang="it-IT" sz="2541" dirty="0">
-                  <a:latin typeface="Consolas" charset="0"/>
-                  <a:ea typeface="Consolas" charset="0"/>
-                  <a:cs typeface="Consolas" charset="0"/>
-                </a:rPr>
-                <a:t> </a:t>
-              </a:r>
-              <a:r>
-                <a:rPr lang="en-US" sz="2541" dirty="0" smtClean="0">
-                  <a:latin typeface="Consolas" charset="0"/>
-                  <a:ea typeface="Consolas" charset="0"/>
-                  <a:cs typeface="Consolas" charset="0"/>
-                </a:rPr>
-                <a:t>q</a:t>
-              </a:r>
-              <a:r>
-                <a:rPr lang="en-US" sz="2541" baseline="-25000" dirty="0" smtClean="0">
-                  <a:latin typeface="Consolas" charset="0"/>
-                  <a:ea typeface="Consolas" charset="0"/>
-                  <a:cs typeface="Consolas" charset="0"/>
-                </a:rPr>
-                <a:t>0</a:t>
-              </a:r>
-              <a:r>
-                <a:rPr lang="it-IT" sz="2541" dirty="0">
-                  <a:latin typeface="Consolas" charset="0"/>
-                  <a:ea typeface="Consolas" charset="0"/>
-                  <a:cs typeface="Consolas" charset="0"/>
-                </a:rPr>
-                <a:t> </a:t>
-              </a:r>
-              <a:r>
-                <a:rPr lang="de-DE" sz="2541" dirty="0" smtClean="0">
-                  <a:latin typeface="Consolas" charset="0"/>
-                  <a:ea typeface="Consolas" charset="0"/>
-                  <a:cs typeface="Consolas" charset="0"/>
-                </a:rPr>
-                <a:t>⟩(</a:t>
-              </a:r>
-              <a:r>
-                <a:rPr lang="en-US" sz="2541" dirty="0" smtClean="0">
-                  <a:latin typeface="Consolas" charset="0"/>
-                  <a:ea typeface="Consolas" charset="0"/>
-                  <a:cs typeface="Consolas" charset="0"/>
-                </a:rPr>
-                <a:t>q</a:t>
-              </a:r>
-              <a:r>
-                <a:rPr lang="en-US" sz="2541" baseline="-25000" dirty="0" smtClean="0">
-                  <a:latin typeface="Consolas" charset="0"/>
-                  <a:ea typeface="Consolas" charset="0"/>
-                  <a:cs typeface="Consolas" charset="0"/>
-                </a:rPr>
-                <a:t>2</a:t>
-              </a:r>
-              <a:r>
-                <a:rPr lang="de-DE" sz="2541" dirty="0" smtClean="0">
-                  <a:latin typeface="Consolas" charset="0"/>
-                  <a:ea typeface="Consolas" charset="0"/>
-                  <a:cs typeface="Consolas" charset="0"/>
-                </a:rPr>
-                <a:t>).</a:t>
-              </a:r>
-            </a:p>
-            <a:p>
-              <a:r>
-                <a:rPr lang="en-US" sz="2541" dirty="0" smtClean="0">
+                </a:endParaRPr>
+              </a:p>
+              <a:p>
+                <a:r>
+                  <a:rPr lang="en-US" sz="2800" dirty="0" err="1" smtClean="0">
+                    <a:solidFill>
+                      <a:schemeClr val="accent5">
+                        <a:lumMod val="75000"/>
+                      </a:schemeClr>
+                    </a:solidFill>
+                    <a:latin typeface="Consolas" charset="0"/>
+                    <a:ea typeface="Consolas" charset="0"/>
+                    <a:cs typeface="Consolas" charset="0"/>
+                  </a:rPr>
+                  <a:t>Qed</a:t>
+                </a:r>
+                <a:r>
+                  <a:rPr lang="en-US" sz="2800" dirty="0" smtClean="0">
+                    <a:solidFill>
+                      <a:schemeClr val="accent5">
+                        <a:lumMod val="75000"/>
+                      </a:schemeClr>
+                    </a:solidFill>
+                    <a:latin typeface="Consolas" charset="0"/>
+                    <a:ea typeface="Consolas" charset="0"/>
+                    <a:cs typeface="Consolas" charset="0"/>
+                  </a:rPr>
+                  <a:t>.</a:t>
+                </a:r>
+                <a:endParaRPr lang="en-US" sz="2800" dirty="0">
                   <a:solidFill>
                     <a:schemeClr val="accent5">
                       <a:lumMod val="75000"/>
@@ -4204,672 +4283,35 @@
                   <a:latin typeface="Consolas" charset="0"/>
                   <a:ea typeface="Consolas" charset="0"/>
                   <a:cs typeface="Consolas" charset="0"/>
-                </a:rPr>
-                <a:t>Proof.</a:t>
-              </a:r>
-            </a:p>
-            <a:p>
-              <a:r>
-                <a:rPr lang="en-US" sz="2541" dirty="0" smtClean="0">
-                  <a:solidFill>
-                    <a:schemeClr val="accent5">
-                      <a:lumMod val="75000"/>
-                    </a:schemeClr>
-                  </a:solidFill>
-                  <a:latin typeface="Consolas" charset="0"/>
-                  <a:ea typeface="Consolas" charset="0"/>
-                  <a:cs typeface="Consolas" charset="0"/>
-                </a:rPr>
-                <a:t>  </a:t>
-              </a:r>
-              <a:r>
-                <a:rPr lang="mr-IN" sz="2541" dirty="0" smtClean="0">
-                  <a:solidFill>
-                    <a:schemeClr val="accent5">
-                      <a:lumMod val="75000"/>
-                    </a:schemeClr>
-                  </a:solidFill>
-                  <a:latin typeface="Consolas" charset="0"/>
-                  <a:ea typeface="Consolas" charset="0"/>
-                  <a:cs typeface="Consolas" charset="0"/>
-                </a:rPr>
-                <a:t>…</a:t>
-              </a:r>
-              <a:r>
-                <a:rPr lang="en-US" sz="2541" dirty="0" smtClean="0">
-                  <a:solidFill>
-                    <a:schemeClr val="accent5">
-                      <a:lumMod val="75000"/>
-                    </a:schemeClr>
-                  </a:solidFill>
-                  <a:latin typeface="Consolas" charset="0"/>
-                  <a:ea typeface="Consolas" charset="0"/>
-                  <a:cs typeface="Consolas" charset="0"/>
-                </a:rPr>
-                <a:t> </a:t>
-              </a:r>
-              <a:r>
-                <a:rPr lang="en-US" sz="2541" dirty="0">
-                  <a:solidFill>
-                    <a:schemeClr val="accent6">
-                      <a:lumMod val="75000"/>
-                    </a:schemeClr>
-                  </a:solidFill>
-                  <a:latin typeface="Consolas" charset="0"/>
-                  <a:ea typeface="Consolas" charset="0"/>
-                  <a:cs typeface="Consolas" charset="0"/>
-                </a:rPr>
-                <a:t>(* </a:t>
-              </a:r>
-              <a:r>
-                <a:rPr lang="en-US" sz="2541" dirty="0" smtClean="0">
-                  <a:solidFill>
-                    <a:schemeClr val="accent6">
-                      <a:lumMod val="75000"/>
-                    </a:schemeClr>
-                  </a:solidFill>
-                  <a:latin typeface="Consolas" charset="0"/>
-                  <a:ea typeface="Consolas" charset="0"/>
-                  <a:cs typeface="Consolas" charset="0"/>
-                </a:rPr>
-                <a:t>proof omitted *)</a:t>
-              </a:r>
-              <a:endParaRPr lang="en-US" sz="2541" dirty="0" smtClean="0">
-                <a:solidFill>
-                  <a:schemeClr val="accent5">
-                    <a:lumMod val="75000"/>
-                  </a:schemeClr>
-                </a:solidFill>
-                <a:latin typeface="Consolas" charset="0"/>
-                <a:ea typeface="Consolas" charset="0"/>
-                <a:cs typeface="Consolas" charset="0"/>
-              </a:endParaRPr>
-            </a:p>
-            <a:p>
-              <a:r>
-                <a:rPr lang="en-US" sz="2541" dirty="0" err="1" smtClean="0">
-                  <a:solidFill>
-                    <a:schemeClr val="accent5">
-                      <a:lumMod val="75000"/>
-                    </a:schemeClr>
-                  </a:solidFill>
-                  <a:latin typeface="Consolas" charset="0"/>
-                  <a:ea typeface="Consolas" charset="0"/>
-                  <a:cs typeface="Consolas" charset="0"/>
-                </a:rPr>
-                <a:t>Qed</a:t>
-              </a:r>
-              <a:r>
-                <a:rPr lang="en-US" sz="2541" dirty="0" smtClean="0">
-                  <a:solidFill>
-                    <a:schemeClr val="accent5">
-                      <a:lumMod val="75000"/>
-                    </a:schemeClr>
-                  </a:solidFill>
-                  <a:latin typeface="Consolas" charset="0"/>
-                  <a:ea typeface="Consolas" charset="0"/>
-                  <a:cs typeface="Consolas" charset="0"/>
-                </a:rPr>
-                <a:t>.</a:t>
-              </a:r>
-              <a:endParaRPr lang="en-US" sz="2541" dirty="0">
-                <a:solidFill>
-                  <a:schemeClr val="accent5">
-                    <a:lumMod val="75000"/>
-                  </a:schemeClr>
-                </a:solidFill>
-                <a:latin typeface="Consolas" charset="0"/>
-                <a:ea typeface="Consolas" charset="0"/>
-                <a:cs typeface="Consolas" charset="0"/>
-              </a:endParaRPr>
-            </a:p>
-          </p:txBody>
-        </p:sp>
-      </p:grpSp>
-      <p:grpSp>
-        <p:nvGrpSpPr>
-          <p:cNvPr id="31" name="Group 30"/>
-          <p:cNvGrpSpPr/>
-          <p:nvPr/>
-        </p:nvGrpSpPr>
-        <p:grpSpPr>
-          <a:xfrm>
-            <a:off x="10739928" y="8856693"/>
-            <a:ext cx="10642332" cy="4104323"/>
-            <a:chOff x="19251623" y="7563602"/>
-            <a:chExt cx="12553765" cy="6279443"/>
-          </a:xfrm>
-        </p:grpSpPr>
-        <p:sp>
-          <p:nvSpPr>
-            <p:cNvPr id="32" name="Rectangle 31"/>
-            <p:cNvSpPr/>
-            <p:nvPr/>
-          </p:nvSpPr>
-          <p:spPr>
-            <a:xfrm>
-              <a:off x="19251623" y="7563602"/>
-              <a:ext cx="12553765" cy="6279443"/>
-            </a:xfrm>
-            <a:prstGeom prst="rect">
-              <a:avLst/>
-            </a:prstGeom>
-            <a:solidFill>
-              <a:schemeClr val="bg1"/>
-            </a:solidFill>
-            <a:ln>
-              <a:solidFill>
-                <a:schemeClr val="bg1">
-                  <a:lumMod val="85000"/>
-                </a:schemeClr>
-              </a:solidFill>
-            </a:ln>
-          </p:spPr>
-          <p:style>
-            <a:lnRef idx="2">
-              <a:schemeClr val="accent1">
-                <a:shade val="50000"/>
-              </a:schemeClr>
-            </a:lnRef>
-            <a:fillRef idx="1">
-              <a:schemeClr val="accent1"/>
-            </a:fillRef>
-            <a:effectRef idx="0">
-              <a:schemeClr val="accent1"/>
-            </a:effectRef>
-            <a:fontRef idx="minor">
-              <a:schemeClr val="lt1"/>
-            </a:fontRef>
-          </p:style>
-          <p:txBody>
-            <a:bodyPr rtlCol="0" anchor="ctr"/>
-            <a:lstStyle/>
-            <a:p>
-              <a:pPr algn="ctr"/>
-              <a:endParaRPr lang="en-US" sz="3659"/>
-            </a:p>
-          </p:txBody>
-        </p:sp>
-        <p:sp>
-          <p:nvSpPr>
-            <p:cNvPr id="36" name="TextBox 35"/>
-            <p:cNvSpPr txBox="1"/>
-            <p:nvPr/>
-          </p:nvSpPr>
-          <p:spPr>
-            <a:xfrm>
-              <a:off x="20145425" y="8744347"/>
-              <a:ext cx="11369714" cy="4927030"/>
-            </a:xfrm>
-            <a:prstGeom prst="rect">
-              <a:avLst/>
-            </a:prstGeom>
-            <a:solidFill>
-              <a:schemeClr val="bg1"/>
-            </a:solidFill>
-          </p:spPr>
-          <p:txBody>
-            <a:bodyPr wrap="square" rtlCol="0">
-              <a:spAutoFit/>
-            </a:bodyPr>
-            <a:lstStyle/>
-            <a:p>
-              <a:r>
-                <a:rPr lang="en-US" sz="2541" dirty="0" smtClean="0">
-                  <a:solidFill>
-                    <a:schemeClr val="accent6">
-                      <a:lumMod val="75000"/>
-                    </a:schemeClr>
-                  </a:solidFill>
-                  <a:latin typeface="Consolas" charset="0"/>
-                  <a:ea typeface="Consolas" charset="0"/>
-                  <a:cs typeface="Consolas" charset="0"/>
-                </a:rPr>
-                <a:t>(* Selection over union push-down *)</a:t>
-              </a:r>
-              <a:endParaRPr lang="en-US" sz="2541" dirty="0">
-                <a:latin typeface="Consolas" charset="0"/>
-                <a:ea typeface="Consolas" charset="0"/>
-                <a:cs typeface="Consolas" charset="0"/>
-              </a:endParaRPr>
-            </a:p>
-            <a:p>
-              <a:r>
-                <a:rPr lang="en-US" sz="2541" dirty="0" smtClean="0">
-                  <a:solidFill>
-                    <a:schemeClr val="accent5">
-                      <a:lumMod val="75000"/>
-                    </a:schemeClr>
-                  </a:solidFill>
-                  <a:latin typeface="Consolas" charset="0"/>
-                  <a:ea typeface="Consolas" charset="0"/>
-                  <a:cs typeface="Consolas" charset="0"/>
-                </a:rPr>
-                <a:t>Definition </a:t>
-              </a:r>
-              <a:r>
-                <a:rPr lang="en-US" sz="2541" dirty="0" err="1" smtClean="0">
-                  <a:latin typeface="Consolas" charset="0"/>
-                  <a:ea typeface="Consolas" charset="0"/>
-                  <a:cs typeface="Consolas" charset="0"/>
-                </a:rPr>
-                <a:t>select_union_distr_fun</a:t>
-              </a:r>
-              <a:r>
-                <a:rPr lang="en-US" sz="2541" dirty="0" smtClean="0">
-                  <a:latin typeface="Consolas" charset="0"/>
-                  <a:ea typeface="Consolas" charset="0"/>
-                  <a:cs typeface="Consolas" charset="0"/>
-                </a:rPr>
-                <a:t> q :=</a:t>
-              </a:r>
-              <a:endParaRPr lang="en-US" sz="2541" dirty="0">
-                <a:latin typeface="Consolas" charset="0"/>
-                <a:ea typeface="Consolas" charset="0"/>
-                <a:cs typeface="Consolas" charset="0"/>
-              </a:endParaRPr>
-            </a:p>
-            <a:p>
-              <a:r>
-                <a:rPr lang="en-US" sz="2541" dirty="0">
-                  <a:latin typeface="Consolas" charset="0"/>
-                  <a:ea typeface="Consolas" charset="0"/>
-                  <a:cs typeface="Consolas" charset="0"/>
-                </a:rPr>
-                <a:t> </a:t>
-              </a:r>
-              <a:r>
-                <a:rPr lang="en-US" sz="2541" dirty="0" smtClean="0">
-                  <a:latin typeface="Consolas" charset="0"/>
-                  <a:ea typeface="Consolas" charset="0"/>
-                  <a:cs typeface="Consolas" charset="0"/>
-                </a:rPr>
-                <a:t> </a:t>
-              </a:r>
-              <a:r>
-                <a:rPr lang="en-US" sz="2541" dirty="0" smtClean="0">
-                  <a:solidFill>
-                    <a:schemeClr val="accent5">
-                      <a:lumMod val="75000"/>
-                    </a:schemeClr>
-                  </a:solidFill>
-                  <a:latin typeface="Consolas" charset="0"/>
-                  <a:ea typeface="Consolas" charset="0"/>
-                  <a:cs typeface="Consolas" charset="0"/>
-                </a:rPr>
-                <a:t>match </a:t>
-              </a:r>
-              <a:r>
-                <a:rPr lang="en-US" sz="2541" dirty="0" smtClean="0">
-                  <a:latin typeface="Consolas" charset="0"/>
-                  <a:ea typeface="Consolas" charset="0"/>
-                  <a:cs typeface="Consolas" charset="0"/>
-                </a:rPr>
-                <a:t>q </a:t>
-              </a:r>
-              <a:r>
-                <a:rPr lang="en-US" sz="2541" dirty="0" smtClean="0">
-                  <a:solidFill>
-                    <a:schemeClr val="accent5">
-                      <a:lumMod val="75000"/>
-                    </a:schemeClr>
-                  </a:solidFill>
-                  <a:latin typeface="Consolas" charset="0"/>
-                  <a:ea typeface="Consolas" charset="0"/>
-                  <a:cs typeface="Consolas" charset="0"/>
-                </a:rPr>
-                <a:t>with</a:t>
-              </a:r>
-              <a:endParaRPr lang="en-US" sz="2541" dirty="0" smtClean="0">
-                <a:latin typeface="Consolas" charset="0"/>
-                <a:ea typeface="Consolas" charset="0"/>
-                <a:cs typeface="Consolas" charset="0"/>
-              </a:endParaRPr>
-            </a:p>
-            <a:p>
-              <a:r>
-                <a:rPr lang="en-US" sz="2541" dirty="0">
-                  <a:latin typeface="Consolas" charset="0"/>
-                  <a:ea typeface="Consolas" charset="0"/>
-                  <a:cs typeface="Consolas" charset="0"/>
-                </a:rPr>
-                <a:t> </a:t>
-              </a:r>
-              <a:r>
-                <a:rPr lang="en-US" sz="2541" dirty="0" smtClean="0">
-                  <a:latin typeface="Consolas" charset="0"/>
-                  <a:ea typeface="Consolas" charset="0"/>
-                  <a:cs typeface="Consolas" charset="0"/>
-                </a:rPr>
-                <a:t> | </a:t>
-              </a:r>
-              <a:r>
-                <a:rPr lang="en-US" sz="2541" dirty="0" err="1" smtClean="0">
-                  <a:latin typeface="Consolas" charset="0"/>
-                  <a:ea typeface="Consolas" charset="0"/>
-                  <a:cs typeface="Consolas" charset="0"/>
-                </a:rPr>
-                <a:t>NRAEnvSelect</a:t>
-              </a:r>
-              <a:r>
-                <a:rPr lang="en-US" sz="2541" dirty="0" smtClean="0">
-                  <a:latin typeface="Consolas" charset="0"/>
-                  <a:ea typeface="Consolas" charset="0"/>
-                  <a:cs typeface="Consolas" charset="0"/>
-                </a:rPr>
-                <a:t> q0 (</a:t>
-              </a:r>
-              <a:r>
-                <a:rPr lang="en-US" sz="2541" dirty="0" err="1" smtClean="0">
-                  <a:latin typeface="Consolas" charset="0"/>
-                  <a:ea typeface="Consolas" charset="0"/>
-                  <a:cs typeface="Consolas" charset="0"/>
-                </a:rPr>
-                <a:t>NRAEnvBinop</a:t>
-              </a:r>
-              <a:r>
-                <a:rPr lang="en-US" sz="2541" dirty="0" smtClean="0">
-                  <a:latin typeface="Consolas" charset="0"/>
-                  <a:ea typeface="Consolas" charset="0"/>
-                  <a:cs typeface="Consolas" charset="0"/>
-                </a:rPr>
-                <a:t> </a:t>
-              </a:r>
-              <a:r>
-                <a:rPr lang="en-US" sz="2541" dirty="0" err="1" smtClean="0">
-                  <a:latin typeface="Consolas" charset="0"/>
-                  <a:ea typeface="Consolas" charset="0"/>
-                  <a:cs typeface="Consolas" charset="0"/>
-                </a:rPr>
-                <a:t>AUnion</a:t>
-              </a:r>
-              <a:r>
-                <a:rPr lang="en-US" sz="2541" dirty="0" smtClean="0">
-                  <a:latin typeface="Consolas" charset="0"/>
-                  <a:ea typeface="Consolas" charset="0"/>
-                  <a:cs typeface="Consolas" charset="0"/>
-                </a:rPr>
-                <a:t> q1 q2) =&gt;</a:t>
-              </a:r>
-              <a:endParaRPr lang="en-US" sz="2541" dirty="0">
-                <a:latin typeface="Consolas" charset="0"/>
-                <a:ea typeface="Consolas" charset="0"/>
-                <a:cs typeface="Consolas" charset="0"/>
-              </a:endParaRPr>
-            </a:p>
-            <a:p>
-              <a:r>
-                <a:rPr lang="en-US" sz="2541" dirty="0">
-                  <a:latin typeface="Consolas" charset="0"/>
-                  <a:ea typeface="Consolas" charset="0"/>
-                  <a:cs typeface="Consolas" charset="0"/>
-                </a:rPr>
-                <a:t> </a:t>
-              </a:r>
-              <a:r>
-                <a:rPr lang="en-US" sz="2541" dirty="0" smtClean="0">
-                  <a:latin typeface="Consolas" charset="0"/>
-                  <a:ea typeface="Consolas" charset="0"/>
-                  <a:cs typeface="Consolas" charset="0"/>
-                </a:rPr>
-                <a:t>     </a:t>
-              </a:r>
-              <a:r>
-                <a:rPr lang="en-US" sz="2541" dirty="0" err="1" smtClean="0">
-                  <a:latin typeface="Consolas" charset="0"/>
-                  <a:ea typeface="Consolas" charset="0"/>
-                  <a:cs typeface="Consolas" charset="0"/>
-                </a:rPr>
-                <a:t>NRAEnvBinop</a:t>
-              </a:r>
-              <a:r>
-                <a:rPr lang="en-US" sz="2541" dirty="0" smtClean="0">
-                  <a:latin typeface="Consolas" charset="0"/>
-                  <a:ea typeface="Consolas" charset="0"/>
-                  <a:cs typeface="Consolas" charset="0"/>
-                </a:rPr>
-                <a:t> </a:t>
-              </a:r>
-              <a:r>
-                <a:rPr lang="en-US" sz="2541" dirty="0" err="1" smtClean="0">
-                  <a:latin typeface="Consolas" charset="0"/>
-                  <a:ea typeface="Consolas" charset="0"/>
-                  <a:cs typeface="Consolas" charset="0"/>
-                </a:rPr>
-                <a:t>AUnion</a:t>
-              </a:r>
-              <a:endParaRPr lang="en-US" sz="2541" dirty="0" smtClean="0">
-                <a:latin typeface="Consolas" charset="0"/>
-                <a:ea typeface="Consolas" charset="0"/>
-                <a:cs typeface="Consolas" charset="0"/>
-              </a:endParaRPr>
-            </a:p>
-            <a:p>
-              <a:r>
-                <a:rPr lang="en-US" sz="2541" dirty="0">
-                  <a:latin typeface="Consolas" charset="0"/>
-                  <a:ea typeface="Consolas" charset="0"/>
-                  <a:cs typeface="Consolas" charset="0"/>
-                </a:rPr>
-                <a:t> </a:t>
-              </a:r>
-              <a:r>
-                <a:rPr lang="en-US" sz="2541" dirty="0" smtClean="0">
-                  <a:latin typeface="Consolas" charset="0"/>
-                  <a:ea typeface="Consolas" charset="0"/>
-                  <a:cs typeface="Consolas" charset="0"/>
-                </a:rPr>
-                <a:t>       (</a:t>
-              </a:r>
-              <a:r>
-                <a:rPr lang="en-US" sz="2541" dirty="0" err="1" smtClean="0">
-                  <a:latin typeface="Consolas" charset="0"/>
-                  <a:ea typeface="Consolas" charset="0"/>
-                  <a:cs typeface="Consolas" charset="0"/>
-                </a:rPr>
-                <a:t>NRAEnvSelect</a:t>
-              </a:r>
-              <a:r>
-                <a:rPr lang="en-US" sz="2541" dirty="0" smtClean="0">
-                  <a:latin typeface="Consolas" charset="0"/>
-                  <a:ea typeface="Consolas" charset="0"/>
-                  <a:cs typeface="Consolas" charset="0"/>
-                </a:rPr>
-                <a:t> q0 q1) (</a:t>
-              </a:r>
-              <a:r>
-                <a:rPr lang="en-US" sz="2541" dirty="0" err="1" smtClean="0">
-                  <a:latin typeface="Consolas" charset="0"/>
-                  <a:ea typeface="Consolas" charset="0"/>
-                  <a:cs typeface="Consolas" charset="0"/>
-                </a:rPr>
-                <a:t>NRAEnvSelect</a:t>
-              </a:r>
-              <a:r>
-                <a:rPr lang="en-US" sz="2541" dirty="0" smtClean="0">
-                  <a:latin typeface="Consolas" charset="0"/>
-                  <a:ea typeface="Consolas" charset="0"/>
-                  <a:cs typeface="Consolas" charset="0"/>
-                </a:rPr>
-                <a:t> q0 q2)</a:t>
-              </a:r>
-            </a:p>
-            <a:p>
-              <a:r>
-                <a:rPr lang="en-US" sz="2541" dirty="0" smtClean="0">
-                  <a:latin typeface="Consolas" charset="0"/>
-                  <a:ea typeface="Consolas" charset="0"/>
-                  <a:cs typeface="Consolas" charset="0"/>
-                </a:rPr>
-                <a:t>  | _ =&gt; q</a:t>
-              </a:r>
-            </a:p>
-            <a:p>
-              <a:r>
-                <a:rPr lang="en-US" sz="2541" dirty="0" smtClean="0">
-                  <a:solidFill>
-                    <a:schemeClr val="accent5">
-                      <a:lumMod val="75000"/>
-                    </a:schemeClr>
-                  </a:solidFill>
-                  <a:latin typeface="Consolas" charset="0"/>
-                  <a:ea typeface="Consolas" charset="0"/>
-                  <a:cs typeface="Consolas" charset="0"/>
-                </a:rPr>
-                <a:t>end</a:t>
-              </a:r>
-              <a:r>
-                <a:rPr lang="en-US" sz="2541" dirty="0" smtClean="0">
-                  <a:latin typeface="Consolas" charset="0"/>
-                  <a:ea typeface="Consolas" charset="0"/>
-                  <a:cs typeface="Consolas" charset="0"/>
-                </a:rPr>
-                <a:t>.</a:t>
-              </a:r>
-              <a:endParaRPr lang="en-US" sz="2541" dirty="0">
-                <a:latin typeface="Consolas" charset="0"/>
-                <a:ea typeface="Consolas" charset="0"/>
-                <a:cs typeface="Consolas" charset="0"/>
-              </a:endParaRPr>
-            </a:p>
-          </p:txBody>
-        </p:sp>
-        <p:cxnSp>
-          <p:nvCxnSpPr>
-            <p:cNvPr id="34" name="Straight Connector 33"/>
-            <p:cNvCxnSpPr/>
-            <p:nvPr/>
-          </p:nvCxnSpPr>
-          <p:spPr>
-            <a:xfrm>
-              <a:off x="19848612" y="8812276"/>
-              <a:ext cx="6567" cy="4647634"/>
-            </a:xfrm>
-            <a:prstGeom prst="line">
-              <a:avLst/>
-            </a:prstGeom>
-            <a:ln w="152400">
-              <a:solidFill>
-                <a:schemeClr val="bg2">
-                  <a:lumMod val="90000"/>
-                </a:schemeClr>
-              </a:solidFill>
-            </a:ln>
-          </p:spPr>
-          <p:style>
-            <a:lnRef idx="1">
-              <a:schemeClr val="accent1"/>
-            </a:lnRef>
-            <a:fillRef idx="0">
-              <a:schemeClr val="accent1"/>
-            </a:fillRef>
-            <a:effectRef idx="0">
-              <a:schemeClr val="accent1"/>
-            </a:effectRef>
-            <a:fontRef idx="minor">
-              <a:schemeClr val="tx1"/>
-            </a:fontRef>
-          </p:style>
-        </p:cxnSp>
-        <p:sp>
-          <p:nvSpPr>
-            <p:cNvPr id="35" name="Rectangle 34"/>
-            <p:cNvSpPr/>
-            <p:nvPr/>
-          </p:nvSpPr>
-          <p:spPr>
-            <a:xfrm>
-              <a:off x="19251624" y="7564596"/>
-              <a:ext cx="12553764" cy="968341"/>
-            </a:xfrm>
-            <a:prstGeom prst="rect">
-              <a:avLst/>
-            </a:prstGeom>
-            <a:solidFill>
-              <a:schemeClr val="accent5">
-                <a:lumMod val="75000"/>
-              </a:schemeClr>
-            </a:solidFill>
-            <a:ln>
-              <a:noFill/>
-            </a:ln>
-          </p:spPr>
-          <p:style>
-            <a:lnRef idx="2">
-              <a:schemeClr val="accent1">
-                <a:shade val="50000"/>
-              </a:schemeClr>
-            </a:lnRef>
-            <a:fillRef idx="1">
-              <a:schemeClr val="accent1"/>
-            </a:fillRef>
-            <a:effectRef idx="0">
-              <a:schemeClr val="accent1"/>
-            </a:effectRef>
-            <a:fontRef idx="minor">
-              <a:schemeClr val="lt1"/>
-            </a:fontRef>
-          </p:style>
-          <p:txBody>
-            <a:bodyPr rtlCol="0" anchor="ctr"/>
-            <a:lstStyle/>
-            <a:p>
-              <a:pPr algn="ctr"/>
-              <a:r>
-                <a:rPr lang="en-US" sz="3106" b="1" dirty="0" smtClean="0">
-                  <a:latin typeface="Courier" charset="0"/>
-                  <a:ea typeface="Courier" charset="0"/>
-                  <a:cs typeface="Courier" charset="0"/>
-                </a:rPr>
-                <a:t>Functional Rewrite</a:t>
-              </a:r>
-              <a:endParaRPr lang="en-US" sz="3106" b="1" dirty="0">
-                <a:latin typeface="Courier" charset="0"/>
-                <a:ea typeface="Courier" charset="0"/>
-                <a:cs typeface="Courier" charset="0"/>
-              </a:endParaRPr>
-            </a:p>
-          </p:txBody>
-        </p:sp>
-      </p:grpSp>
-      <p:grpSp>
-        <p:nvGrpSpPr>
-          <p:cNvPr id="50" name="Group 49"/>
-          <p:cNvGrpSpPr/>
-          <p:nvPr/>
-        </p:nvGrpSpPr>
-        <p:grpSpPr>
-          <a:xfrm>
-            <a:off x="5254465" y="13198693"/>
-            <a:ext cx="11028371" cy="3766787"/>
-            <a:chOff x="1818255" y="17334776"/>
-            <a:chExt cx="13819142" cy="4989183"/>
-          </a:xfrm>
-        </p:grpSpPr>
+                </a:endParaRPr>
+              </a:p>
+            </p:txBody>
+          </p:sp>
+        </p:grpSp>
         <p:grpSp>
           <p:nvGrpSpPr>
-            <p:cNvPr id="54" name="Group 53"/>
+            <p:cNvPr id="31" name="Group 30"/>
             <p:cNvGrpSpPr/>
             <p:nvPr/>
           </p:nvGrpSpPr>
           <p:grpSpPr>
             <a:xfrm>
-              <a:off x="1818255" y="17334776"/>
-              <a:ext cx="13819142" cy="4989183"/>
-              <a:chOff x="4206240" y="2312754"/>
-              <a:chExt cx="12179809" cy="4244870"/>
+              <a:off x="10666073" y="8843965"/>
+              <a:ext cx="10574607" cy="3972725"/>
+              <a:chOff x="19164501" y="7544129"/>
+              <a:chExt cx="12473876" cy="6078104"/>
             </a:xfrm>
           </p:grpSpPr>
           <p:sp>
             <p:nvSpPr>
-              <p:cNvPr id="56" name="Rectangle 55"/>
+              <p:cNvPr id="32" name="Rectangle 31"/>
               <p:cNvSpPr/>
               <p:nvPr/>
             </p:nvSpPr>
             <p:spPr>
               <a:xfrm>
-                <a:off x="4206240" y="2312754"/>
-                <a:ext cx="12179808" cy="4244870"/>
+                <a:off x="19164501" y="7544129"/>
+                <a:ext cx="12473876" cy="6078104"/>
               </a:xfrm>
               <a:prstGeom prst="rect">
                 <a:avLst/>
@@ -4910,53 +4352,340 @@
               </a:p>
             </p:txBody>
           </p:sp>
-          <p:cxnSp>
-            <p:nvCxnSpPr>
-              <p:cNvPr id="57" name="Straight Connector 56"/>
-              <p:cNvCxnSpPr/>
+          <p:sp>
+            <p:nvSpPr>
+              <p:cNvPr id="36" name="TextBox 35"/>
+              <p:cNvSpPr txBox="1"/>
               <p:nvPr/>
-            </p:nvCxnSpPr>
+            </p:nvSpPr>
             <p:spPr>
-              <a:xfrm flipH="1">
-                <a:off x="4716652" y="3308483"/>
-                <a:ext cx="1" cy="3000317"/>
+              <a:xfrm>
+                <a:off x="19475048" y="8724874"/>
+                <a:ext cx="12163329" cy="4755941"/>
               </a:xfrm>
-              <a:prstGeom prst="line">
+              <a:prstGeom prst="rect">
                 <a:avLst/>
               </a:prstGeom>
-              <a:ln w="152400">
-                <a:solidFill>
-                  <a:schemeClr val="bg2">
-                    <a:lumMod val="90000"/>
-                  </a:schemeClr>
-                </a:solidFill>
-              </a:ln>
+              <a:solidFill>
+                <a:schemeClr val="bg1"/>
+              </a:solidFill>
             </p:spPr>
-            <p:style>
-              <a:lnRef idx="1">
-                <a:schemeClr val="accent1"/>
-              </a:lnRef>
-              <a:fillRef idx="0">
-                <a:schemeClr val="accent1"/>
-              </a:fillRef>
-              <a:effectRef idx="0">
-                <a:schemeClr val="accent1"/>
-              </a:effectRef>
-              <a:fontRef idx="minor">
-                <a:schemeClr val="tx1"/>
-              </a:fontRef>
-            </p:style>
-          </p:cxnSp>
+            <p:txBody>
+              <a:bodyPr wrap="square" rtlCol="0">
+                <a:spAutoFit/>
+              </a:bodyPr>
+              <a:lstStyle/>
+              <a:p>
+                <a:r>
+                  <a:rPr lang="en-US" sz="2800" dirty="0" smtClean="0">
+                    <a:solidFill>
+                      <a:schemeClr val="accent5">
+                        <a:lumMod val="75000"/>
+                      </a:schemeClr>
+                    </a:solidFill>
+                    <a:latin typeface="Consolas" charset="0"/>
+                    <a:ea typeface="Consolas" charset="0"/>
+                    <a:cs typeface="Consolas" charset="0"/>
+                  </a:rPr>
+                  <a:t>Definition </a:t>
+                </a:r>
+                <a:r>
+                  <a:rPr lang="en-US" sz="2800" dirty="0" err="1" smtClean="0">
+                    <a:latin typeface="Consolas" charset="0"/>
+                    <a:ea typeface="Consolas" charset="0"/>
+                    <a:cs typeface="Consolas" charset="0"/>
+                  </a:rPr>
+                  <a:t>select_union_distr_fun</a:t>
+                </a:r>
+                <a:r>
+                  <a:rPr lang="en-US" sz="2800" dirty="0" smtClean="0">
+                    <a:latin typeface="Consolas" charset="0"/>
+                    <a:ea typeface="Consolas" charset="0"/>
+                    <a:cs typeface="Consolas" charset="0"/>
+                  </a:rPr>
+                  <a:t> q :=</a:t>
+                </a:r>
+                <a:endParaRPr lang="en-US" sz="2800" dirty="0">
+                  <a:latin typeface="Consolas" charset="0"/>
+                  <a:ea typeface="Consolas" charset="0"/>
+                  <a:cs typeface="Consolas" charset="0"/>
+                </a:endParaRPr>
+              </a:p>
+              <a:p>
+                <a:r>
+                  <a:rPr lang="en-US" sz="2800" dirty="0">
+                    <a:latin typeface="Consolas" charset="0"/>
+                    <a:ea typeface="Consolas" charset="0"/>
+                    <a:cs typeface="Consolas" charset="0"/>
+                  </a:rPr>
+                  <a:t> </a:t>
+                </a:r>
+                <a:r>
+                  <a:rPr lang="en-US" sz="2800" dirty="0" smtClean="0">
+                    <a:latin typeface="Consolas" charset="0"/>
+                    <a:ea typeface="Consolas" charset="0"/>
+                    <a:cs typeface="Consolas" charset="0"/>
+                  </a:rPr>
+                  <a:t> </a:t>
+                </a:r>
+                <a:r>
+                  <a:rPr lang="en-US" sz="2800" dirty="0" smtClean="0">
+                    <a:solidFill>
+                      <a:schemeClr val="accent5">
+                        <a:lumMod val="75000"/>
+                      </a:schemeClr>
+                    </a:solidFill>
+                    <a:latin typeface="Consolas" charset="0"/>
+                    <a:ea typeface="Consolas" charset="0"/>
+                    <a:cs typeface="Consolas" charset="0"/>
+                  </a:rPr>
+                  <a:t>match </a:t>
+                </a:r>
+                <a:r>
+                  <a:rPr lang="en-US" sz="2800" dirty="0" smtClean="0">
+                    <a:latin typeface="Consolas" charset="0"/>
+                    <a:ea typeface="Consolas" charset="0"/>
+                    <a:cs typeface="Consolas" charset="0"/>
+                  </a:rPr>
+                  <a:t>q </a:t>
+                </a:r>
+                <a:r>
+                  <a:rPr lang="en-US" sz="2800" dirty="0" smtClean="0">
+                    <a:solidFill>
+                      <a:schemeClr val="accent5">
+                        <a:lumMod val="75000"/>
+                      </a:schemeClr>
+                    </a:solidFill>
+                    <a:latin typeface="Consolas" charset="0"/>
+                    <a:ea typeface="Consolas" charset="0"/>
+                    <a:cs typeface="Consolas" charset="0"/>
+                  </a:rPr>
+                  <a:t>with</a:t>
+                </a:r>
+                <a:endParaRPr lang="en-US" sz="2800" dirty="0" smtClean="0">
+                  <a:latin typeface="Consolas" charset="0"/>
+                  <a:ea typeface="Consolas" charset="0"/>
+                  <a:cs typeface="Consolas" charset="0"/>
+                </a:endParaRPr>
+              </a:p>
+              <a:p>
+                <a:r>
+                  <a:rPr lang="en-US" sz="2800" dirty="0">
+                    <a:latin typeface="Consolas" charset="0"/>
+                    <a:ea typeface="Consolas" charset="0"/>
+                    <a:cs typeface="Consolas" charset="0"/>
+                  </a:rPr>
+                  <a:t> </a:t>
+                </a:r>
+                <a:r>
+                  <a:rPr lang="en-US" sz="2800" dirty="0" smtClean="0">
+                    <a:latin typeface="Consolas" charset="0"/>
+                    <a:ea typeface="Consolas" charset="0"/>
+                    <a:cs typeface="Consolas" charset="0"/>
+                  </a:rPr>
+                  <a:t> | </a:t>
+                </a:r>
+                <a:r>
+                  <a:rPr lang="en-US" sz="2800" dirty="0" err="1" smtClean="0">
+                    <a:latin typeface="Consolas" charset="0"/>
+                    <a:ea typeface="Consolas" charset="0"/>
+                    <a:cs typeface="Consolas" charset="0"/>
+                  </a:rPr>
+                  <a:t>NRAEnvSelect</a:t>
+                </a:r>
+                <a:r>
+                  <a:rPr lang="en-US" sz="2800" dirty="0" smtClean="0">
+                    <a:latin typeface="Consolas" charset="0"/>
+                    <a:ea typeface="Consolas" charset="0"/>
+                    <a:cs typeface="Consolas" charset="0"/>
+                  </a:rPr>
+                  <a:t> q0 (</a:t>
+                </a:r>
+                <a:r>
+                  <a:rPr lang="en-US" sz="2800" dirty="0" err="1" smtClean="0">
+                    <a:latin typeface="Consolas" charset="0"/>
+                    <a:ea typeface="Consolas" charset="0"/>
+                    <a:cs typeface="Consolas" charset="0"/>
+                  </a:rPr>
+                  <a:t>NRAEnvBinop</a:t>
+                </a:r>
+                <a:r>
+                  <a:rPr lang="en-US" sz="2800" dirty="0" smtClean="0">
+                    <a:latin typeface="Consolas" charset="0"/>
+                    <a:ea typeface="Consolas" charset="0"/>
+                    <a:cs typeface="Consolas" charset="0"/>
+                  </a:rPr>
+                  <a:t> </a:t>
+                </a:r>
+                <a:r>
+                  <a:rPr lang="en-US" sz="2800" dirty="0" err="1" smtClean="0">
+                    <a:latin typeface="Consolas" charset="0"/>
+                    <a:ea typeface="Consolas" charset="0"/>
+                    <a:cs typeface="Consolas" charset="0"/>
+                  </a:rPr>
+                  <a:t>AUnion</a:t>
+                </a:r>
+                <a:r>
+                  <a:rPr lang="en-US" sz="2800" dirty="0" smtClean="0">
+                    <a:latin typeface="Consolas" charset="0"/>
+                    <a:ea typeface="Consolas" charset="0"/>
+                    <a:cs typeface="Consolas" charset="0"/>
+                  </a:rPr>
+                  <a:t> q1 q2) =&gt;</a:t>
+                </a:r>
+                <a:endParaRPr lang="en-US" sz="2800" dirty="0">
+                  <a:latin typeface="Consolas" charset="0"/>
+                  <a:ea typeface="Consolas" charset="0"/>
+                  <a:cs typeface="Consolas" charset="0"/>
+                </a:endParaRPr>
+              </a:p>
+              <a:p>
+                <a:r>
+                  <a:rPr lang="en-US" sz="2800" dirty="0">
+                    <a:latin typeface="Consolas" charset="0"/>
+                    <a:ea typeface="Consolas" charset="0"/>
+                    <a:cs typeface="Consolas" charset="0"/>
+                  </a:rPr>
+                  <a:t> </a:t>
+                </a:r>
+                <a:r>
+                  <a:rPr lang="en-US" sz="2800" dirty="0" smtClean="0">
+                    <a:latin typeface="Consolas" charset="0"/>
+                    <a:ea typeface="Consolas" charset="0"/>
+                    <a:cs typeface="Consolas" charset="0"/>
+                  </a:rPr>
+                  <a:t>     </a:t>
+                </a:r>
+                <a:r>
+                  <a:rPr lang="en-US" sz="2800" dirty="0" err="1" smtClean="0">
+                    <a:latin typeface="Consolas" charset="0"/>
+                    <a:ea typeface="Consolas" charset="0"/>
+                    <a:cs typeface="Consolas" charset="0"/>
+                  </a:rPr>
+                  <a:t>NRAEnvBinop</a:t>
+                </a:r>
+                <a:r>
+                  <a:rPr lang="en-US" sz="2800" dirty="0" smtClean="0">
+                    <a:latin typeface="Consolas" charset="0"/>
+                    <a:ea typeface="Consolas" charset="0"/>
+                    <a:cs typeface="Consolas" charset="0"/>
+                  </a:rPr>
+                  <a:t> </a:t>
+                </a:r>
+                <a:r>
+                  <a:rPr lang="en-US" sz="2800" dirty="0" err="1" smtClean="0">
+                    <a:latin typeface="Consolas" charset="0"/>
+                    <a:ea typeface="Consolas" charset="0"/>
+                    <a:cs typeface="Consolas" charset="0"/>
+                  </a:rPr>
+                  <a:t>AUnion</a:t>
+                </a:r>
+                <a:endParaRPr lang="en-US" sz="2800" dirty="0" smtClean="0">
+                  <a:latin typeface="Consolas" charset="0"/>
+                  <a:ea typeface="Consolas" charset="0"/>
+                  <a:cs typeface="Consolas" charset="0"/>
+                </a:endParaRPr>
+              </a:p>
+              <a:p>
+                <a:r>
+                  <a:rPr lang="en-US" sz="2800" dirty="0">
+                    <a:latin typeface="Consolas" charset="0"/>
+                    <a:ea typeface="Consolas" charset="0"/>
+                    <a:cs typeface="Consolas" charset="0"/>
+                  </a:rPr>
+                  <a:t> </a:t>
+                </a:r>
+                <a:r>
+                  <a:rPr lang="en-US" sz="2800" dirty="0" smtClean="0">
+                    <a:latin typeface="Consolas" charset="0"/>
+                    <a:ea typeface="Consolas" charset="0"/>
+                    <a:cs typeface="Consolas" charset="0"/>
+                  </a:rPr>
+                  <a:t>       (</a:t>
+                </a:r>
+                <a:r>
+                  <a:rPr lang="en-US" sz="2800" dirty="0" err="1" smtClean="0">
+                    <a:latin typeface="Consolas" charset="0"/>
+                    <a:ea typeface="Consolas" charset="0"/>
+                    <a:cs typeface="Consolas" charset="0"/>
+                  </a:rPr>
+                  <a:t>NRAEnvSelect</a:t>
+                </a:r>
+                <a:r>
+                  <a:rPr lang="en-US" sz="2800" dirty="0" smtClean="0">
+                    <a:latin typeface="Consolas" charset="0"/>
+                    <a:ea typeface="Consolas" charset="0"/>
+                    <a:cs typeface="Consolas" charset="0"/>
+                  </a:rPr>
+                  <a:t> q0 q1) (</a:t>
+                </a:r>
+                <a:r>
+                  <a:rPr lang="en-US" sz="2800" dirty="0" err="1" smtClean="0">
+                    <a:latin typeface="Consolas" charset="0"/>
+                    <a:ea typeface="Consolas" charset="0"/>
+                    <a:cs typeface="Consolas" charset="0"/>
+                  </a:rPr>
+                  <a:t>NRAEnvSelect</a:t>
+                </a:r>
+                <a:r>
+                  <a:rPr lang="en-US" sz="2800" dirty="0" smtClean="0">
+                    <a:latin typeface="Consolas" charset="0"/>
+                    <a:ea typeface="Consolas" charset="0"/>
+                    <a:cs typeface="Consolas" charset="0"/>
+                  </a:rPr>
+                  <a:t> q0 q2)</a:t>
+                </a:r>
+              </a:p>
+              <a:p>
+                <a:r>
+                  <a:rPr lang="en-US" sz="2800" dirty="0" smtClean="0">
+                    <a:latin typeface="Consolas" charset="0"/>
+                    <a:ea typeface="Consolas" charset="0"/>
+                    <a:cs typeface="Consolas" charset="0"/>
+                  </a:rPr>
+                  <a:t>  | _ =&gt; q</a:t>
+                </a:r>
+              </a:p>
+              <a:p>
+                <a:r>
+                  <a:rPr lang="en-US" sz="2800" dirty="0" smtClean="0">
+                    <a:solidFill>
+                      <a:schemeClr val="accent5">
+                        <a:lumMod val="75000"/>
+                      </a:schemeClr>
+                    </a:solidFill>
+                    <a:latin typeface="Consolas" charset="0"/>
+                    <a:ea typeface="Consolas" charset="0"/>
+                    <a:cs typeface="Consolas" charset="0"/>
+                  </a:rPr>
+                  <a:t>  end</a:t>
+                </a:r>
+                <a:r>
+                  <a:rPr lang="en-US" sz="2800" dirty="0" smtClean="0">
+                    <a:latin typeface="Consolas" charset="0"/>
+                    <a:ea typeface="Consolas" charset="0"/>
+                    <a:cs typeface="Consolas" charset="0"/>
+                  </a:rPr>
+                  <a:t>.</a:t>
+                </a:r>
+                <a:endParaRPr lang="en-US" sz="2800" dirty="0">
+                  <a:latin typeface="Consolas" charset="0"/>
+                  <a:ea typeface="Consolas" charset="0"/>
+                  <a:cs typeface="Consolas" charset="0"/>
+                </a:endParaRPr>
+              </a:p>
+            </p:txBody>
+          </p:sp>
           <p:sp>
             <p:nvSpPr>
-              <p:cNvPr id="58" name="Rectangle 57"/>
+              <p:cNvPr id="35" name="Rectangle 34"/>
               <p:cNvSpPr/>
               <p:nvPr/>
             </p:nvSpPr>
             <p:spPr>
               <a:xfrm>
-                <a:off x="4206240" y="2313748"/>
-                <a:ext cx="12179809" cy="733401"/>
+                <a:off x="19164501" y="7545123"/>
+                <a:ext cx="12473876" cy="968341"/>
               </a:xfrm>
               <a:prstGeom prst="rect">
                 <a:avLst/>
@@ -4997,7 +4726,7 @@
                     <a:ea typeface="Courier" charset="0"/>
                     <a:cs typeface="Courier" charset="0"/>
                   </a:rPr>
-                  <a:t>Correctness Proof</a:t>
+                  <a:t>Functional Rewrite</a:t>
                 </a:r>
                 <a:endParaRPr lang="en-US" sz="3106" b="1" dirty="0">
                   <a:latin typeface="Courier" charset="0"/>
@@ -5008,47 +4737,398 @@
             </p:txBody>
           </p:sp>
         </p:grpSp>
-        <p:sp>
-          <p:nvSpPr>
-            <p:cNvPr id="55" name="TextBox 54"/>
-            <p:cNvSpPr txBox="1"/>
+        <p:grpSp>
+          <p:nvGrpSpPr>
+            <p:cNvPr id="50" name="Group 49"/>
+            <p:cNvGrpSpPr/>
             <p:nvPr/>
-          </p:nvSpPr>
-          <p:spPr>
+          </p:nvGrpSpPr>
+          <p:grpSpPr>
             <a:xfrm>
-              <a:off x="2700516" y="18430946"/>
-              <a:ext cx="12150548" cy="3747548"/>
+              <a:off x="5254465" y="13198693"/>
+              <a:ext cx="11028371" cy="3766787"/>
+              <a:chOff x="1818255" y="17334776"/>
+              <a:chExt cx="13819142" cy="4989183"/>
             </a:xfrm>
-            <a:prstGeom prst="rect">
-              <a:avLst/>
-            </a:prstGeom>
-            <a:solidFill>
-              <a:schemeClr val="bg1"/>
-            </a:solidFill>
-          </p:spPr>
-          <p:txBody>
-            <a:bodyPr wrap="square" rtlCol="0">
-              <a:spAutoFit/>
-            </a:bodyPr>
-            <a:lstStyle/>
-            <a:p>
-              <a:r>
-                <a:rPr lang="en-US" sz="2541" dirty="0" smtClean="0">
+          </p:grpSpPr>
+          <p:grpSp>
+            <p:nvGrpSpPr>
+              <p:cNvPr id="54" name="Group 53"/>
+              <p:cNvGrpSpPr/>
+              <p:nvPr/>
+            </p:nvGrpSpPr>
+            <p:grpSpPr>
+              <a:xfrm>
+                <a:off x="1818255" y="17334776"/>
+                <a:ext cx="13819142" cy="4989183"/>
+                <a:chOff x="4206240" y="2312754"/>
+                <a:chExt cx="12179809" cy="4244870"/>
+              </a:xfrm>
+            </p:grpSpPr>
+            <p:sp>
+              <p:nvSpPr>
+                <p:cNvPr id="56" name="Rectangle 55"/>
+                <p:cNvSpPr/>
+                <p:nvPr/>
+              </p:nvSpPr>
+              <p:spPr>
+                <a:xfrm>
+                  <a:off x="4206240" y="2312754"/>
+                  <a:ext cx="12179808" cy="4244870"/>
+                </a:xfrm>
+                <a:prstGeom prst="rect">
+                  <a:avLst/>
+                </a:prstGeom>
+                <a:solidFill>
+                  <a:schemeClr val="bg1"/>
+                </a:solidFill>
+                <a:ln>
                   <a:solidFill>
-                    <a:schemeClr val="accent6">
-                      <a:lumMod val="75000"/>
+                    <a:schemeClr val="bg1">
+                      <a:lumMod val="85000"/>
                     </a:schemeClr>
                   </a:solidFill>
-                  <a:latin typeface="Consolas" charset="0"/>
-                  <a:ea typeface="Consolas" charset="0"/>
-                  <a:cs typeface="Consolas" charset="0"/>
-                </a:rPr>
-                <a:t>(* Selection over union push-down is correct *)</a:t>
-              </a:r>
-            </a:p>
-            <a:p>
-              <a:r>
-                <a:rPr lang="en-US" sz="2541" dirty="0" smtClean="0">
+                </a:ln>
+              </p:spPr>
+              <p:style>
+                <a:lnRef idx="2">
+                  <a:schemeClr val="accent1">
+                    <a:shade val="50000"/>
+                  </a:schemeClr>
+                </a:lnRef>
+                <a:fillRef idx="1">
+                  <a:schemeClr val="accent1"/>
+                </a:fillRef>
+                <a:effectRef idx="0">
+                  <a:schemeClr val="accent1"/>
+                </a:effectRef>
+                <a:fontRef idx="minor">
+                  <a:schemeClr val="lt1"/>
+                </a:fontRef>
+              </p:style>
+              <p:txBody>
+                <a:bodyPr rtlCol="0" anchor="ctr"/>
+                <a:lstStyle/>
+                <a:p>
+                  <a:pPr algn="ctr"/>
+                  <a:endParaRPr lang="en-US" sz="3659"/>
+                </a:p>
+              </p:txBody>
+            </p:sp>
+            <p:sp>
+              <p:nvSpPr>
+                <p:cNvPr id="58" name="Rectangle 57"/>
+                <p:cNvSpPr/>
+                <p:nvPr/>
+              </p:nvSpPr>
+              <p:spPr>
+                <a:xfrm>
+                  <a:off x="4206240" y="2313748"/>
+                  <a:ext cx="12179809" cy="733401"/>
+                </a:xfrm>
+                <a:prstGeom prst="rect">
+                  <a:avLst/>
+                </a:prstGeom>
+                <a:solidFill>
+                  <a:schemeClr val="accent5">
+                    <a:lumMod val="75000"/>
+                  </a:schemeClr>
+                </a:solidFill>
+                <a:ln>
+                  <a:noFill/>
+                </a:ln>
+              </p:spPr>
+              <p:style>
+                <a:lnRef idx="2">
+                  <a:schemeClr val="accent1">
+                    <a:shade val="50000"/>
+                  </a:schemeClr>
+                </a:lnRef>
+                <a:fillRef idx="1">
+                  <a:schemeClr val="accent1"/>
+                </a:fillRef>
+                <a:effectRef idx="0">
+                  <a:schemeClr val="accent1"/>
+                </a:effectRef>
+                <a:fontRef idx="minor">
+                  <a:schemeClr val="lt1"/>
+                </a:fontRef>
+              </p:style>
+              <p:txBody>
+                <a:bodyPr rtlCol="0" anchor="ctr"/>
+                <a:lstStyle/>
+                <a:p>
+                  <a:pPr algn="ctr"/>
+                  <a:r>
+                    <a:rPr lang="en-US" sz="3106" b="1" dirty="0" smtClean="0">
+                      <a:latin typeface="Courier" charset="0"/>
+                      <a:ea typeface="Courier" charset="0"/>
+                      <a:cs typeface="Courier" charset="0"/>
+                    </a:rPr>
+                    <a:t>Correctness Proof</a:t>
+                  </a:r>
+                  <a:endParaRPr lang="en-US" sz="3106" b="1" dirty="0">
+                    <a:latin typeface="Courier" charset="0"/>
+                    <a:ea typeface="Courier" charset="0"/>
+                    <a:cs typeface="Courier" charset="0"/>
+                  </a:endParaRPr>
+                </a:p>
+              </p:txBody>
+            </p:sp>
+          </p:grpSp>
+          <p:sp>
+            <p:nvSpPr>
+              <p:cNvPr id="55" name="TextBox 54"/>
+              <p:cNvSpPr txBox="1"/>
+              <p:nvPr/>
+            </p:nvSpPr>
+            <p:spPr>
+              <a:xfrm>
+                <a:off x="2095342" y="18430946"/>
+                <a:ext cx="13460212" cy="3546608"/>
+              </a:xfrm>
+              <a:prstGeom prst="rect">
+                <a:avLst/>
+              </a:prstGeom>
+              <a:solidFill>
+                <a:schemeClr val="bg1"/>
+              </a:solidFill>
+            </p:spPr>
+            <p:txBody>
+              <a:bodyPr wrap="square" rtlCol="0">
+                <a:spAutoFit/>
+              </a:bodyPr>
+              <a:lstStyle/>
+              <a:p>
+                <a:r>
+                  <a:rPr lang="en-US" sz="2800" dirty="0" smtClean="0">
+                    <a:solidFill>
+                      <a:schemeClr val="accent5">
+                        <a:lumMod val="75000"/>
+                      </a:schemeClr>
+                    </a:solidFill>
+                    <a:latin typeface="Consolas" charset="0"/>
+                    <a:ea typeface="Consolas" charset="0"/>
+                    <a:cs typeface="Consolas" charset="0"/>
+                  </a:rPr>
+                  <a:t>Property </a:t>
+                </a:r>
+                <a:r>
+                  <a:rPr lang="en-US" sz="2800" dirty="0" err="1" smtClean="0">
+                    <a:latin typeface="Consolas" charset="0"/>
+                    <a:ea typeface="Consolas" charset="0"/>
+                    <a:cs typeface="Consolas" charset="0"/>
+                  </a:rPr>
+                  <a:t>select_union_distr_fun_correctness</a:t>
+                </a:r>
+                <a:r>
+                  <a:rPr lang="en-US" sz="2800" dirty="0" smtClean="0">
+                    <a:latin typeface="Consolas" charset="0"/>
+                    <a:ea typeface="Consolas" charset="0"/>
+                    <a:cs typeface="Consolas" charset="0"/>
+                  </a:rPr>
+                  <a:t> q</a:t>
+                </a:r>
+                <a:r>
+                  <a:rPr lang="en-US" sz="2800" baseline="-25000" dirty="0" smtClean="0">
+                    <a:latin typeface="Consolas" charset="0"/>
+                    <a:ea typeface="Consolas" charset="0"/>
+                    <a:cs typeface="Consolas" charset="0"/>
+                  </a:rPr>
+                  <a:t>0</a:t>
+                </a:r>
+                <a:r>
+                  <a:rPr lang="en-US" sz="2800" dirty="0" smtClean="0">
+                    <a:latin typeface="Consolas" charset="0"/>
+                    <a:ea typeface="Consolas" charset="0"/>
+                    <a:cs typeface="Consolas" charset="0"/>
+                  </a:rPr>
+                  <a:t> q</a:t>
+                </a:r>
+                <a:r>
+                  <a:rPr lang="en-US" sz="2800" baseline="-25000" dirty="0" smtClean="0">
+                    <a:latin typeface="Consolas" charset="0"/>
+                    <a:ea typeface="Consolas" charset="0"/>
+                    <a:cs typeface="Consolas" charset="0"/>
+                  </a:rPr>
+                  <a:t>1</a:t>
+                </a:r>
+                <a:r>
+                  <a:rPr lang="en-US" sz="2800" dirty="0" smtClean="0">
+                    <a:latin typeface="Consolas" charset="0"/>
+                    <a:ea typeface="Consolas" charset="0"/>
+                    <a:cs typeface="Consolas" charset="0"/>
+                  </a:rPr>
+                  <a:t> q</a:t>
+                </a:r>
+                <a:r>
+                  <a:rPr lang="en-US" sz="2800" baseline="-25000" dirty="0" smtClean="0">
+                    <a:latin typeface="Consolas" charset="0"/>
+                    <a:ea typeface="Consolas" charset="0"/>
+                    <a:cs typeface="Consolas" charset="0"/>
+                  </a:rPr>
+                  <a:t>2</a:t>
+                </a:r>
+                <a:r>
+                  <a:rPr lang="en-US" sz="2800" dirty="0" smtClean="0">
+                    <a:latin typeface="Consolas" charset="0"/>
+                    <a:ea typeface="Consolas" charset="0"/>
+                    <a:cs typeface="Consolas" charset="0"/>
+                  </a:rPr>
+                  <a:t> :</a:t>
+                </a:r>
+              </a:p>
+              <a:p>
+                <a:r>
+                  <a:rPr lang="it-IT" sz="2800" dirty="0" smtClean="0">
+                    <a:latin typeface="Consolas" charset="0"/>
+                    <a:ea typeface="Consolas" charset="0"/>
+                    <a:cs typeface="Consolas" charset="0"/>
+                  </a:rPr>
+                  <a:t> </a:t>
+                </a:r>
+                <a:r>
+                  <a:rPr lang="en-US" sz="2800" dirty="0" err="1">
+                    <a:latin typeface="Consolas" charset="0"/>
+                    <a:ea typeface="Consolas" charset="0"/>
+                    <a:cs typeface="Consolas" charset="0"/>
+                  </a:rPr>
+                  <a:t>select_union_distr_fun</a:t>
+                </a:r>
+                <a:r>
+                  <a:rPr lang="en-US" sz="2800" dirty="0">
+                    <a:latin typeface="Consolas" charset="0"/>
+                    <a:ea typeface="Consolas" charset="0"/>
+                    <a:cs typeface="Consolas" charset="0"/>
+                  </a:rPr>
+                  <a:t> </a:t>
+                </a:r>
+                <a:r>
+                  <a:rPr lang="en-US" sz="2800" dirty="0" smtClean="0">
+                    <a:latin typeface="Consolas" charset="0"/>
+                    <a:ea typeface="Consolas" charset="0"/>
+                    <a:cs typeface="Consolas" charset="0"/>
+                  </a:rPr>
+                  <a:t>q </a:t>
+                </a:r>
+                <a:r>
+                  <a:rPr lang="de-DE" sz="2800" dirty="0" smtClean="0">
+                    <a:latin typeface="Consolas" charset="0"/>
+                    <a:ea typeface="Consolas" charset="0"/>
+                    <a:cs typeface="Consolas" charset="0"/>
+                  </a:rPr>
+                  <a:t>≡ </a:t>
+                </a:r>
+                <a:r>
+                  <a:rPr lang="en-US" sz="2800" dirty="0" smtClean="0">
+                    <a:latin typeface="Consolas" charset="0"/>
+                    <a:ea typeface="Consolas" charset="0"/>
+                    <a:cs typeface="Consolas" charset="0"/>
+                  </a:rPr>
+                  <a:t>q</a:t>
+                </a:r>
+                <a:r>
+                  <a:rPr lang="de-DE" sz="2800" dirty="0" smtClean="0">
+                    <a:latin typeface="Consolas" charset="0"/>
+                    <a:ea typeface="Consolas" charset="0"/>
+                    <a:cs typeface="Consolas" charset="0"/>
+                  </a:rPr>
+                  <a:t>.</a:t>
+                </a:r>
+              </a:p>
+              <a:p>
+                <a:r>
+                  <a:rPr lang="en-US" sz="2800" dirty="0" smtClean="0">
+                    <a:solidFill>
+                      <a:schemeClr val="accent5">
+                        <a:lumMod val="75000"/>
+                      </a:schemeClr>
+                    </a:solidFill>
+                    <a:latin typeface="Consolas" charset="0"/>
+                    <a:ea typeface="Consolas" charset="0"/>
+                    <a:cs typeface="Consolas" charset="0"/>
+                  </a:rPr>
+                  <a:t>Proof.</a:t>
+                </a:r>
+              </a:p>
+              <a:p>
+                <a:r>
+                  <a:rPr lang="en-US" sz="2800" dirty="0" smtClean="0">
+                    <a:solidFill>
+                      <a:schemeClr val="accent5">
+                        <a:lumMod val="75000"/>
+                      </a:schemeClr>
+                    </a:solidFill>
+                    <a:latin typeface="Consolas" charset="0"/>
+                    <a:ea typeface="Consolas" charset="0"/>
+                    <a:cs typeface="Consolas" charset="0"/>
+                  </a:rPr>
+                  <a:t> Hint Rewrite </a:t>
+                </a:r>
+                <a:r>
+                  <a:rPr lang="en-US" sz="2800" dirty="0" err="1" smtClean="0">
+                    <a:latin typeface="Consolas" charset="0"/>
+                    <a:ea typeface="Consolas" charset="0"/>
+                    <a:cs typeface="Consolas" charset="0"/>
+                  </a:rPr>
+                  <a:t>select_union_distr</a:t>
+                </a:r>
+                <a:r>
+                  <a:rPr lang="en-US" sz="2800" dirty="0" smtClean="0">
+                    <a:latin typeface="Consolas" charset="0"/>
+                    <a:ea typeface="Consolas" charset="0"/>
+                    <a:cs typeface="Consolas" charset="0"/>
+                  </a:rPr>
+                  <a:t> : </a:t>
+                </a:r>
+                <a:r>
+                  <a:rPr lang="en-US" sz="2800" dirty="0" err="1" smtClean="0">
+                    <a:latin typeface="Consolas" charset="0"/>
+                    <a:ea typeface="Consolas" charset="0"/>
+                    <a:cs typeface="Consolas" charset="0"/>
+                  </a:rPr>
+                  <a:t>envmap_eqs</a:t>
+                </a:r>
+                <a:r>
+                  <a:rPr lang="en-US" sz="2800" dirty="0" smtClean="0">
+                    <a:latin typeface="Consolas" charset="0"/>
+                    <a:ea typeface="Consolas" charset="0"/>
+                    <a:cs typeface="Consolas" charset="0"/>
+                  </a:rPr>
+                  <a:t>.</a:t>
+                </a:r>
+              </a:p>
+              <a:p>
+                <a:r>
+                  <a:rPr lang="en-US" sz="2800" dirty="0">
+                    <a:solidFill>
+                      <a:schemeClr val="accent5">
+                        <a:lumMod val="75000"/>
+                      </a:schemeClr>
+                    </a:solidFill>
+                    <a:latin typeface="Consolas" charset="0"/>
+                    <a:ea typeface="Consolas" charset="0"/>
+                    <a:cs typeface="Consolas" charset="0"/>
+                  </a:rPr>
+                  <a:t> </a:t>
+                </a:r>
+                <a:r>
+                  <a:rPr lang="en-US" sz="2800" dirty="0" err="1" smtClean="0">
+                    <a:latin typeface="Consolas" charset="0"/>
+                    <a:ea typeface="Consolas" charset="0"/>
+                    <a:cs typeface="Consolas" charset="0"/>
+                  </a:rPr>
+                  <a:t>prove_correctness</a:t>
+                </a:r>
+                <a:r>
+                  <a:rPr lang="en-US" sz="2800" dirty="0" smtClean="0">
+                    <a:latin typeface="Consolas" charset="0"/>
+                    <a:ea typeface="Consolas" charset="0"/>
+                    <a:cs typeface="Consolas" charset="0"/>
+                  </a:rPr>
+                  <a:t> q.</a:t>
+                </a:r>
+                <a:endParaRPr lang="en-US" sz="2800" dirty="0" smtClean="0">
                   <a:solidFill>
                     <a:schemeClr val="accent5">
                       <a:lumMod val="75000"/>
@@ -5057,135 +5137,36 @@
                   <a:latin typeface="Consolas" charset="0"/>
                   <a:ea typeface="Consolas" charset="0"/>
                   <a:cs typeface="Consolas" charset="0"/>
-                </a:rPr>
-                <a:t>Property </a:t>
-              </a:r>
-              <a:r>
-                <a:rPr lang="en-US" sz="2541" dirty="0" err="1" smtClean="0">
-                  <a:latin typeface="Consolas" charset="0"/>
-                  <a:ea typeface="Consolas" charset="0"/>
-                  <a:cs typeface="Consolas" charset="0"/>
-                </a:rPr>
-                <a:t>select_union_distr_fun_correctness</a:t>
-              </a:r>
-              <a:r>
-                <a:rPr lang="en-US" sz="2541" dirty="0" smtClean="0">
-                  <a:latin typeface="Consolas" charset="0"/>
-                  <a:ea typeface="Consolas" charset="0"/>
-                  <a:cs typeface="Consolas" charset="0"/>
-                </a:rPr>
-                <a:t> q</a:t>
-              </a:r>
-              <a:r>
-                <a:rPr lang="en-US" sz="2541" baseline="-25000" dirty="0" smtClean="0">
-                  <a:latin typeface="Consolas" charset="0"/>
-                  <a:ea typeface="Consolas" charset="0"/>
-                  <a:cs typeface="Consolas" charset="0"/>
-                </a:rPr>
-                <a:t>0</a:t>
-              </a:r>
-              <a:r>
-                <a:rPr lang="en-US" sz="2541" dirty="0" smtClean="0">
-                  <a:latin typeface="Consolas" charset="0"/>
-                  <a:ea typeface="Consolas" charset="0"/>
-                  <a:cs typeface="Consolas" charset="0"/>
-                </a:rPr>
-                <a:t> q</a:t>
-              </a:r>
-              <a:r>
-                <a:rPr lang="en-US" sz="2541" baseline="-25000" dirty="0" smtClean="0">
-                  <a:latin typeface="Consolas" charset="0"/>
-                  <a:ea typeface="Consolas" charset="0"/>
-                  <a:cs typeface="Consolas" charset="0"/>
-                </a:rPr>
-                <a:t>1</a:t>
-              </a:r>
-              <a:r>
-                <a:rPr lang="en-US" sz="2541" dirty="0" smtClean="0">
-                  <a:latin typeface="Consolas" charset="0"/>
-                  <a:ea typeface="Consolas" charset="0"/>
-                  <a:cs typeface="Consolas" charset="0"/>
-                </a:rPr>
-                <a:t> q</a:t>
-              </a:r>
-              <a:r>
-                <a:rPr lang="en-US" sz="2541" baseline="-25000" dirty="0" smtClean="0">
-                  <a:latin typeface="Consolas" charset="0"/>
-                  <a:ea typeface="Consolas" charset="0"/>
-                  <a:cs typeface="Consolas" charset="0"/>
-                </a:rPr>
-                <a:t>2</a:t>
-              </a:r>
-              <a:r>
-                <a:rPr lang="en-US" sz="2541" dirty="0" smtClean="0">
-                  <a:latin typeface="Consolas" charset="0"/>
-                  <a:ea typeface="Consolas" charset="0"/>
-                  <a:cs typeface="Consolas" charset="0"/>
-                </a:rPr>
-                <a:t> :</a:t>
-              </a:r>
-            </a:p>
-            <a:p>
-              <a:r>
-                <a:rPr lang="it-IT" sz="2541" dirty="0" smtClean="0">
-                  <a:latin typeface="Consolas" charset="0"/>
-                  <a:ea typeface="Consolas" charset="0"/>
-                  <a:cs typeface="Consolas" charset="0"/>
-                </a:rPr>
-                <a:t> </a:t>
-              </a:r>
-              <a:r>
-                <a:rPr lang="en-US" sz="2541" dirty="0" err="1">
-                  <a:latin typeface="Consolas" charset="0"/>
-                  <a:ea typeface="Consolas" charset="0"/>
-                  <a:cs typeface="Consolas" charset="0"/>
-                </a:rPr>
-                <a:t>select_union_distr_fun</a:t>
-              </a:r>
-              <a:r>
-                <a:rPr lang="en-US" sz="2541" dirty="0">
-                  <a:latin typeface="Consolas" charset="0"/>
-                  <a:ea typeface="Consolas" charset="0"/>
-                  <a:cs typeface="Consolas" charset="0"/>
-                </a:rPr>
-                <a:t> </a:t>
-              </a:r>
-              <a:r>
-                <a:rPr lang="en-US" sz="2541" dirty="0" smtClean="0">
-                  <a:latin typeface="Consolas" charset="0"/>
-                  <a:ea typeface="Consolas" charset="0"/>
-                  <a:cs typeface="Consolas" charset="0"/>
-                </a:rPr>
-                <a:t>q </a:t>
-              </a:r>
-              <a:r>
-                <a:rPr lang="de-DE" sz="2541" dirty="0" smtClean="0">
-                  <a:latin typeface="Consolas" charset="0"/>
-                  <a:ea typeface="Consolas" charset="0"/>
-                  <a:cs typeface="Consolas" charset="0"/>
-                </a:rPr>
-                <a:t>≡ </a:t>
-              </a:r>
-              <a:r>
-                <a:rPr lang="en-US" sz="2541" dirty="0" smtClean="0">
-                  <a:latin typeface="Consolas" charset="0"/>
-                  <a:ea typeface="Consolas" charset="0"/>
-                  <a:cs typeface="Consolas" charset="0"/>
-                </a:rPr>
-                <a:t>q</a:t>
-              </a:r>
-              <a:r>
-                <a:rPr lang="de-DE" sz="2541" dirty="0" smtClean="0">
-                  <a:latin typeface="Consolas" charset="0"/>
-                  <a:ea typeface="Consolas" charset="0"/>
-                  <a:cs typeface="Consolas" charset="0"/>
-                </a:rPr>
-                <a:t>.</a:t>
-              </a:r>
-            </a:p>
-            <a:p>
-              <a:r>
-                <a:rPr lang="en-US" sz="2541" dirty="0" smtClean="0">
+                </a:endParaRPr>
+              </a:p>
+              <a:p>
+                <a:r>
+                  <a:rPr lang="en-US" sz="2800" dirty="0" err="1" smtClean="0">
+                    <a:solidFill>
+                      <a:schemeClr val="accent5">
+                        <a:lumMod val="75000"/>
+                      </a:schemeClr>
+                    </a:solidFill>
+                    <a:latin typeface="Consolas" charset="0"/>
+                    <a:ea typeface="Consolas" charset="0"/>
+                    <a:cs typeface="Consolas" charset="0"/>
+                  </a:rPr>
+                  <a:t>Qed</a:t>
+                </a:r>
+                <a:r>
+                  <a:rPr lang="en-US" sz="2800" dirty="0" smtClean="0">
+                    <a:solidFill>
+                      <a:schemeClr val="accent5">
+                        <a:lumMod val="75000"/>
+                      </a:schemeClr>
+                    </a:solidFill>
+                    <a:latin typeface="Consolas" charset="0"/>
+                    <a:ea typeface="Consolas" charset="0"/>
+                    <a:cs typeface="Consolas" charset="0"/>
+                  </a:rPr>
+                  <a:t>.</a:t>
+                </a:r>
+                <a:endParaRPr lang="en-US" sz="2800" dirty="0">
                   <a:solidFill>
                     <a:schemeClr val="accent5">
                       <a:lumMod val="75000"/>
@@ -5194,138 +5175,11 @@
                   <a:latin typeface="Consolas" charset="0"/>
                   <a:ea typeface="Consolas" charset="0"/>
                   <a:cs typeface="Consolas" charset="0"/>
-                </a:rPr>
-                <a:t>Proof.</a:t>
-              </a:r>
-            </a:p>
-            <a:p>
-              <a:r>
-                <a:rPr lang="en-US" sz="2541" dirty="0" smtClean="0">
-                  <a:solidFill>
-                    <a:schemeClr val="accent5">
-                      <a:lumMod val="75000"/>
-                    </a:schemeClr>
-                  </a:solidFill>
-                  <a:latin typeface="Consolas" charset="0"/>
-                  <a:ea typeface="Consolas" charset="0"/>
-                  <a:cs typeface="Consolas" charset="0"/>
-                </a:rPr>
-                <a:t> Hint Rewrite </a:t>
-              </a:r>
-              <a:r>
-                <a:rPr lang="en-US" sz="2541" dirty="0" err="1" smtClean="0">
-                  <a:latin typeface="Consolas" charset="0"/>
-                  <a:ea typeface="Consolas" charset="0"/>
-                  <a:cs typeface="Consolas" charset="0"/>
-                </a:rPr>
-                <a:t>select_union_distr</a:t>
-              </a:r>
-              <a:r>
-                <a:rPr lang="en-US" sz="2541" dirty="0" smtClean="0">
-                  <a:latin typeface="Consolas" charset="0"/>
-                  <a:ea typeface="Consolas" charset="0"/>
-                  <a:cs typeface="Consolas" charset="0"/>
-                </a:rPr>
-                <a:t> : </a:t>
-              </a:r>
-              <a:r>
-                <a:rPr lang="en-US" sz="2541" dirty="0" err="1" smtClean="0">
-                  <a:latin typeface="Consolas" charset="0"/>
-                  <a:ea typeface="Consolas" charset="0"/>
-                  <a:cs typeface="Consolas" charset="0"/>
-                </a:rPr>
-                <a:t>envmap_eqs</a:t>
-              </a:r>
-              <a:r>
-                <a:rPr lang="en-US" sz="2541" dirty="0" smtClean="0">
-                  <a:latin typeface="Consolas" charset="0"/>
-                  <a:ea typeface="Consolas" charset="0"/>
-                  <a:cs typeface="Consolas" charset="0"/>
-                </a:rPr>
-                <a:t>.</a:t>
-              </a:r>
-            </a:p>
-            <a:p>
-              <a:r>
-                <a:rPr lang="en-US" sz="2541" dirty="0">
-                  <a:solidFill>
-                    <a:schemeClr val="accent5">
-                      <a:lumMod val="75000"/>
-                    </a:schemeClr>
-                  </a:solidFill>
-                  <a:latin typeface="Consolas" charset="0"/>
-                  <a:ea typeface="Consolas" charset="0"/>
-                  <a:cs typeface="Consolas" charset="0"/>
-                </a:rPr>
-                <a:t> </a:t>
-              </a:r>
-              <a:r>
-                <a:rPr lang="en-US" sz="2541" dirty="0" err="1" smtClean="0">
-                  <a:latin typeface="Consolas" charset="0"/>
-                  <a:ea typeface="Consolas" charset="0"/>
-                  <a:cs typeface="Consolas" charset="0"/>
-                </a:rPr>
-                <a:t>prove_correctness</a:t>
-              </a:r>
-              <a:r>
-                <a:rPr lang="en-US" sz="2541" dirty="0" smtClean="0">
-                  <a:latin typeface="Consolas" charset="0"/>
-                  <a:ea typeface="Consolas" charset="0"/>
-                  <a:cs typeface="Consolas" charset="0"/>
-                </a:rPr>
-                <a:t> q.</a:t>
-              </a:r>
-              <a:endParaRPr lang="en-US" sz="2541" dirty="0" smtClean="0">
-                <a:solidFill>
-                  <a:schemeClr val="accent5">
-                    <a:lumMod val="75000"/>
-                  </a:schemeClr>
-                </a:solidFill>
-                <a:latin typeface="Consolas" charset="0"/>
-                <a:ea typeface="Consolas" charset="0"/>
-                <a:cs typeface="Consolas" charset="0"/>
-              </a:endParaRPr>
-            </a:p>
-            <a:p>
-              <a:r>
-                <a:rPr lang="en-US" sz="2541" dirty="0" err="1" smtClean="0">
-                  <a:solidFill>
-                    <a:schemeClr val="accent5">
-                      <a:lumMod val="75000"/>
-                    </a:schemeClr>
-                  </a:solidFill>
-                  <a:latin typeface="Consolas" charset="0"/>
-                  <a:ea typeface="Consolas" charset="0"/>
-                  <a:cs typeface="Consolas" charset="0"/>
-                </a:rPr>
-                <a:t>Qed</a:t>
-              </a:r>
-              <a:r>
-                <a:rPr lang="en-US" sz="2541" dirty="0" smtClean="0">
-                  <a:solidFill>
-                    <a:schemeClr val="accent5">
-                      <a:lumMod val="75000"/>
-                    </a:schemeClr>
-                  </a:solidFill>
-                  <a:latin typeface="Consolas" charset="0"/>
-                  <a:ea typeface="Consolas" charset="0"/>
-                  <a:cs typeface="Consolas" charset="0"/>
-                </a:rPr>
-                <a:t>.</a:t>
-              </a:r>
-              <a:endParaRPr lang="en-US" sz="2541" dirty="0">
-                <a:solidFill>
-                  <a:schemeClr val="accent5">
-                    <a:lumMod val="75000"/>
-                  </a:schemeClr>
-                </a:solidFill>
-                <a:latin typeface="Consolas" charset="0"/>
-                <a:ea typeface="Consolas" charset="0"/>
-                <a:cs typeface="Consolas" charset="0"/>
-              </a:endParaRPr>
-            </a:p>
-          </p:txBody>
-        </p:sp>
+                </a:endParaRPr>
+              </a:p>
+            </p:txBody>
+          </p:sp>
+        </p:grpSp>
       </p:grpSp>
       <p:sp>
         <p:nvSpPr>
@@ -5378,33 +5232,7 @@
                 <a:ea typeface="Consolas" charset="0"/>
                 <a:cs typeface="Consolas" charset="0"/>
               </a:rPr>
-              <a:t>github.com</a:t>
-            </a:r>
-            <a:r>
-              <a:rPr lang="en-US" sz="4800" b="1" dirty="0" smtClean="0">
-                <a:solidFill>
-                  <a:schemeClr val="accent5">
-                    <a:lumMod val="75000"/>
-                  </a:schemeClr>
-                </a:solidFill>
-                <a:latin typeface="Consolas" charset="0"/>
-                <a:ea typeface="Consolas" charset="0"/>
-                <a:cs typeface="Consolas" charset="0"/>
-              </a:rPr>
-              <a:t>/</a:t>
-            </a:r>
-            <a:r>
-              <a:rPr lang="en-US" sz="4800" b="1" dirty="0" err="1" smtClean="0">
-                <a:solidFill>
-                  <a:schemeClr val="accent5">
-                    <a:lumMod val="75000"/>
-                  </a:schemeClr>
-                </a:solidFill>
-                <a:latin typeface="Consolas" charset="0"/>
-                <a:ea typeface="Consolas" charset="0"/>
-                <a:cs typeface="Consolas" charset="0"/>
-              </a:rPr>
-              <a:t>querycert</a:t>
+              <a:t>querycert.github.io</a:t>
             </a:r>
             <a:endParaRPr lang="en-US" sz="4800" b="1" dirty="0">
               <a:solidFill>
@@ -5419,203 +5247,6 @@
           </a:p>
         </p:txBody>
       </p:sp>
-      <p:pic>
-        <p:nvPicPr>
-          <p:cNvPr id="2" name="Picture 1"/>
-          <p:cNvPicPr>
-            <a:picLocks noChangeAspect="1"/>
-          </p:cNvPicPr>
-          <p:nvPr/>
-        </p:nvPicPr>
-        <p:blipFill>
-          <a:blip r:embed="rId4">
-            <a:extLst>
-              <a:ext uri="{28A0092B-C50C-407E-A947-70E740481C1C}">
-                <a14:useLocalDpi xmlns:a14="http://schemas.microsoft.com/office/drawing/2010/main" val="0"/>
-              </a:ext>
-            </a:extLst>
-          </a:blip>
-          <a:stretch>
-            <a:fillRect/>
-          </a:stretch>
-        </p:blipFill>
-        <p:spPr>
-          <a:xfrm>
-            <a:off x="12768943" y="26997152"/>
-            <a:ext cx="7840496" cy="4374526"/>
-          </a:xfrm>
-          <a:prstGeom prst="rect">
-            <a:avLst/>
-          </a:prstGeom>
-        </p:spPr>
-      </p:pic>
-      <p:grpSp>
-        <p:nvGrpSpPr>
-          <p:cNvPr id="37" name="Group 36"/>
-          <p:cNvGrpSpPr/>
-          <p:nvPr/>
-        </p:nvGrpSpPr>
-        <p:grpSpPr>
-          <a:xfrm>
-            <a:off x="859511" y="26571254"/>
-            <a:ext cx="9880416" cy="4374526"/>
-            <a:chOff x="-2574390" y="9688962"/>
-            <a:chExt cx="17947959" cy="5847987"/>
-          </a:xfrm>
-        </p:grpSpPr>
-        <p:sp>
-          <p:nvSpPr>
-            <p:cNvPr id="38" name="Rectangle 37"/>
-            <p:cNvSpPr/>
-            <p:nvPr/>
-          </p:nvSpPr>
-          <p:spPr>
-            <a:xfrm>
-              <a:off x="-2574390" y="9688962"/>
-              <a:ext cx="17394284" cy="5847987"/>
-            </a:xfrm>
-            <a:prstGeom prst="rect">
-              <a:avLst/>
-            </a:prstGeom>
-            <a:solidFill>
-              <a:schemeClr val="accent4">
-                <a:lumMod val="40000"/>
-                <a:lumOff val="60000"/>
-              </a:schemeClr>
-            </a:solidFill>
-            <a:ln>
-              <a:noFill/>
-            </a:ln>
-          </p:spPr>
-          <p:style>
-            <a:lnRef idx="2">
-              <a:schemeClr val="accent1">
-                <a:shade val="50000"/>
-              </a:schemeClr>
-            </a:lnRef>
-            <a:fillRef idx="1">
-              <a:schemeClr val="accent1"/>
-            </a:fillRef>
-            <a:effectRef idx="0">
-              <a:schemeClr val="accent1"/>
-            </a:effectRef>
-            <a:fontRef idx="minor">
-              <a:schemeClr val="lt1"/>
-            </a:fontRef>
-          </p:style>
-          <p:txBody>
-            <a:bodyPr rtlCol="0" anchor="ctr"/>
-            <a:lstStyle/>
-            <a:p>
-              <a:pPr algn="ctr"/>
-              <a:endParaRPr lang="en-US" sz="3659"/>
-            </a:p>
-          </p:txBody>
-        </p:sp>
-        <p:sp>
-          <p:nvSpPr>
-            <p:cNvPr id="39" name="TextBox 38"/>
-            <p:cNvSpPr txBox="1"/>
-            <p:nvPr/>
-          </p:nvSpPr>
-          <p:spPr>
-            <a:xfrm>
-              <a:off x="-749239" y="9752521"/>
-              <a:ext cx="16122808" cy="4828812"/>
-            </a:xfrm>
-            <a:prstGeom prst="rect">
-              <a:avLst/>
-            </a:prstGeom>
-            <a:solidFill>
-              <a:schemeClr val="accent4">
-                <a:lumMod val="40000"/>
-                <a:lumOff val="60000"/>
-              </a:schemeClr>
-            </a:solidFill>
-          </p:spPr>
-          <p:txBody>
-            <a:bodyPr wrap="square" rtlCol="0">
-              <a:spAutoFit/>
-            </a:bodyPr>
-            <a:lstStyle/>
-            <a:p>
-              <a:r>
-                <a:rPr lang="en-US" sz="3812" b="1" dirty="0">
-                  <a:solidFill>
-                    <a:schemeClr val="accent5">
-                      <a:lumMod val="75000"/>
-                    </a:schemeClr>
-                  </a:solidFill>
-                  <a:latin typeface="Consolas" charset="0"/>
-                  <a:ea typeface="Consolas" charset="0"/>
-                  <a:cs typeface="Consolas" charset="0"/>
-                </a:rPr>
-                <a:t>Features</a:t>
-              </a:r>
-            </a:p>
-            <a:p>
-              <a:r>
-                <a:rPr lang="en-US" sz="3812" dirty="0" smtClean="0">
-                  <a:latin typeface="Helvetica Neue Light" charset="0"/>
-                  <a:ea typeface="Helvetica Neue Light" charset="0"/>
-                  <a:cs typeface="Helvetica Neue Light" charset="0"/>
-                </a:rPr>
-                <a:t>Nested Data Model with Objects</a:t>
-              </a:r>
-            </a:p>
-            <a:p>
-              <a:r>
-                <a:rPr lang="en-US" sz="3812" dirty="0" smtClean="0">
-                  <a:latin typeface="Helvetica Neue Light" charset="0"/>
-                  <a:ea typeface="Helvetica Neue Light" charset="0"/>
-                  <a:cs typeface="Helvetica Neue Light" charset="0"/>
-                </a:rPr>
-                <a:t>Type Checking</a:t>
-              </a:r>
-            </a:p>
-            <a:p>
-              <a:r>
-                <a:rPr lang="en-US" sz="3812" dirty="0" smtClean="0">
-                  <a:latin typeface="Helvetica Neue Light" charset="0"/>
-                  <a:ea typeface="Helvetica Neue Light" charset="0"/>
-                  <a:cs typeface="Helvetica Neue Light" charset="0"/>
-                </a:rPr>
-                <a:t>Aggregate Queries</a:t>
-              </a:r>
-            </a:p>
-            <a:p>
-              <a:r>
-                <a:rPr lang="en-US" sz="3812" smtClean="0">
-                  <a:latin typeface="Helvetica Neue Light" charset="0"/>
-                  <a:ea typeface="Helvetica Neue Light" charset="0"/>
-                  <a:cs typeface="Helvetica Neue Light" charset="0"/>
-                </a:rPr>
-                <a:t>External Types and Functions</a:t>
-              </a:r>
-              <a:endParaRPr lang="en-US" sz="3812" dirty="0" smtClean="0">
-                <a:latin typeface="Helvetica Neue Light" charset="0"/>
-                <a:ea typeface="Helvetica Neue Light" charset="0"/>
-                <a:cs typeface="Helvetica Neue Light" charset="0"/>
-              </a:endParaRPr>
-            </a:p>
-            <a:p>
-              <a:r>
-                <a:rPr lang="en-US" sz="3812" dirty="0" smtClean="0">
-                  <a:latin typeface="Helvetica Neue Light" charset="0"/>
-                  <a:ea typeface="Helvetica Neue Light" charset="0"/>
-                  <a:cs typeface="Helvetica Neue Light" charset="0"/>
-                </a:rPr>
-                <a:t>JSON Support</a:t>
-              </a:r>
-              <a:endParaRPr lang="en-US" sz="3812" dirty="0">
-                <a:latin typeface="Helvetica Neue Light" charset="0"/>
-                <a:ea typeface="Helvetica Neue Light" charset="0"/>
-                <a:cs typeface="Helvetica Neue Light" charset="0"/>
-              </a:endParaRPr>
-            </a:p>
-          </p:txBody>
-        </p:sp>
-      </p:grpSp>
       <p:grpSp>
         <p:nvGrpSpPr>
           <p:cNvPr id="3" name="Group 2"/>
@@ -5624,10 +5255,10 @@
         </p:nvGrpSpPr>
         <p:grpSpPr>
           <a:xfrm>
-            <a:off x="1240972" y="17405921"/>
-            <a:ext cx="19368467" cy="8553990"/>
+            <a:off x="1979105" y="8757087"/>
+            <a:ext cx="17812235" cy="8758811"/>
             <a:chOff x="1371600" y="17503892"/>
-            <a:chExt cx="19368467" cy="8553990"/>
+            <a:chExt cx="19368467" cy="9456083"/>
           </a:xfrm>
         </p:grpSpPr>
         <p:pic>
@@ -5639,7 +5270,7 @@
             <p:nvPr/>
           </p:nvPicPr>
           <p:blipFill>
-            <a:blip r:embed="rId5">
+            <a:blip r:embed="rId4">
               <a:extLst>
                 <a:ext uri="{28A0092B-C50C-407E-A947-70E740481C1C}">
                   <a14:useLocalDpi xmlns:a14="http://schemas.microsoft.com/office/drawing/2010/main" val="0"/>
@@ -5652,8 +5283,8 @@
           </p:blipFill>
           <p:spPr>
             <a:xfrm>
-              <a:off x="1371600" y="18149092"/>
-              <a:ext cx="19368467" cy="7908790"/>
+              <a:off x="1371601" y="18149091"/>
+              <a:ext cx="19368466" cy="8810884"/>
             </a:xfrm>
             <a:prstGeom prst="rect">
               <a:avLst/>
@@ -5721,6 +5352,144 @@
           </p:txBody>
         </p:sp>
       </p:grpSp>
+      <p:pic>
+        <p:nvPicPr>
+          <p:cNvPr id="2" name="Picture 1"/>
+          <p:cNvPicPr>
+            <a:picLocks noChangeAspect="1"/>
+          </p:cNvPicPr>
+          <p:nvPr/>
+        </p:nvPicPr>
+        <p:blipFill>
+          <a:blip r:embed="rId5">
+            <a:extLst>
+              <a:ext uri="{28A0092B-C50C-407E-A947-70E740481C1C}">
+                <a14:useLocalDpi xmlns:a14="http://schemas.microsoft.com/office/drawing/2010/main" val="0"/>
+              </a:ext>
+            </a:extLst>
+          </a:blip>
+          <a:stretch>
+            <a:fillRect/>
+          </a:stretch>
+        </p:blipFill>
+        <p:spPr>
+          <a:xfrm>
+            <a:off x="12974726" y="27107983"/>
+            <a:ext cx="7840496" cy="4374526"/>
+          </a:xfrm>
+          <a:prstGeom prst="rect">
+            <a:avLst/>
+          </a:prstGeom>
+        </p:spPr>
+      </p:pic>
+      <p:sp>
+        <p:nvSpPr>
+          <p:cNvPr id="39" name="TextBox 38"/>
+          <p:cNvSpPr txBox="1"/>
+          <p:nvPr/>
+        </p:nvSpPr>
+        <p:spPr>
+          <a:xfrm>
+            <a:off x="1979105" y="26541432"/>
+            <a:ext cx="8993694" cy="4198778"/>
+          </a:xfrm>
+          <a:prstGeom prst="rect">
+            <a:avLst/>
+          </a:prstGeom>
+          <a:solidFill>
+            <a:schemeClr val="accent4">
+              <a:lumMod val="40000"/>
+              <a:lumOff val="60000"/>
+            </a:schemeClr>
+          </a:solidFill>
+        </p:spPr>
+        <p:txBody>
+          <a:bodyPr wrap="square" rtlCol="0">
+            <a:spAutoFit/>
+          </a:bodyPr>
+          <a:lstStyle/>
+          <a:p>
+            <a:r>
+              <a:rPr lang="en-US" sz="3812" b="1" dirty="0">
+                <a:solidFill>
+                  <a:schemeClr val="accent5">
+                    <a:lumMod val="75000"/>
+                  </a:schemeClr>
+                </a:solidFill>
+                <a:latin typeface="Consolas" charset="0"/>
+                <a:ea typeface="Consolas" charset="0"/>
+                <a:cs typeface="Consolas" charset="0"/>
+              </a:rPr>
+              <a:t>Features</a:t>
+            </a:r>
+          </a:p>
+          <a:p>
+            <a:r>
+              <a:rPr lang="en-US" sz="3812" dirty="0" smtClean="0">
+                <a:latin typeface="Helvetica Neue Light" charset="0"/>
+                <a:ea typeface="Helvetica Neue Light" charset="0"/>
+                <a:cs typeface="Helvetica Neue Light" charset="0"/>
+              </a:rPr>
+              <a:t>Nested Data Model with Objects</a:t>
+            </a:r>
+          </a:p>
+          <a:p>
+            <a:r>
+              <a:rPr lang="en-US" sz="3812" dirty="0" smtClean="0">
+                <a:latin typeface="Helvetica Neue Light" charset="0"/>
+                <a:ea typeface="Helvetica Neue Light" charset="0"/>
+                <a:cs typeface="Helvetica Neue Light" charset="0"/>
+              </a:rPr>
+              <a:t>Type Checking</a:t>
+            </a:r>
+          </a:p>
+          <a:p>
+            <a:r>
+              <a:rPr lang="en-US" sz="3812" dirty="0" smtClean="0">
+                <a:latin typeface="Helvetica Neue Light" charset="0"/>
+                <a:ea typeface="Helvetica Neue Light" charset="0"/>
+                <a:cs typeface="Helvetica Neue Light" charset="0"/>
+              </a:rPr>
+              <a:t>Aggregate Queries (includes TPC-H)</a:t>
+            </a:r>
+          </a:p>
+          <a:p>
+            <a:r>
+              <a:rPr lang="en-US" sz="3812" dirty="0" smtClean="0">
+                <a:latin typeface="Helvetica Neue Light" charset="0"/>
+                <a:ea typeface="Helvetica Neue Light" charset="0"/>
+                <a:cs typeface="Helvetica Neue Light" charset="0"/>
+              </a:rPr>
+              <a:t>Configurable Optimizer</a:t>
+            </a:r>
+          </a:p>
+          <a:p>
+            <a:r>
+              <a:rPr lang="en-US" sz="3812" dirty="0" smtClean="0">
+                <a:latin typeface="Helvetica Neue Light" charset="0"/>
+                <a:ea typeface="Helvetica Neue Light" charset="0"/>
+                <a:cs typeface="Helvetica Neue Light" charset="0"/>
+              </a:rPr>
+              <a:t>External Types and Functions</a:t>
+            </a:r>
+          </a:p>
+          <a:p>
+            <a:r>
+              <a:rPr lang="en-US" sz="3812" dirty="0" smtClean="0">
+                <a:latin typeface="Helvetica Neue Light" charset="0"/>
+                <a:ea typeface="Helvetica Neue Light" charset="0"/>
+                <a:cs typeface="Helvetica Neue Light" charset="0"/>
+              </a:rPr>
+              <a:t>JSON Support</a:t>
+            </a:r>
+            <a:endParaRPr lang="en-US" sz="3812" dirty="0">
+              <a:latin typeface="Helvetica Neue Light" charset="0"/>
+              <a:ea typeface="Helvetica Neue Light" charset="0"/>
+              <a:cs typeface="Helvetica Neue Light" charset="0"/>
+            </a:endParaRPr>
+          </a:p>
+        </p:txBody>
+      </p:sp>
       <p:sp>
         <p:nvSpPr>
           <p:cNvPr id="48" name="Rectangle 47"/>
@@ -5729,7 +5498,7 @@
         </p:nvSpPr>
         <p:spPr>
           <a:xfrm>
-            <a:off x="12768944" y="26337129"/>
+            <a:off x="12974727" y="26447960"/>
             <a:ext cx="7840496" cy="666229"/>
           </a:xfrm>
           <a:prstGeom prst="rect">
@@ -5791,6 +5560,13 @@
   <p:clrMapOvr>
     <a:masterClrMapping/>
   </p:clrMapOvr>
+  <p:timing>
+    <p:tnLst>
+      <p:par>
+        <p:cTn id="1" dur="indefinite" restart="never" nodeType="tmRoot"/>
+      </p:par>
+    </p:tnLst>
+  </p:timing>
 </p:sld>
 </file>
 

</xml_diff>